<commit_message>
finish working(waiting for approval)
</commit_message>
<xml_diff>
--- a/pRactice.pptx
+++ b/pRactice.pptx
@@ -6,22 +6,23 @@
   </p:sldMasterIdLst>
   <p:sldIdLst>
     <p:sldId id="256" r:id="rId2"/>
-    <p:sldId id="258" r:id="rId3"/>
-    <p:sldId id="257" r:id="rId4"/>
-    <p:sldId id="261" r:id="rId5"/>
-    <p:sldId id="264" r:id="rId6"/>
-    <p:sldId id="266" r:id="rId7"/>
-    <p:sldId id="259" r:id="rId8"/>
-    <p:sldId id="262" r:id="rId9"/>
-    <p:sldId id="268" r:id="rId10"/>
-    <p:sldId id="270" r:id="rId11"/>
-    <p:sldId id="269" r:id="rId12"/>
-    <p:sldId id="271" r:id="rId13"/>
-    <p:sldId id="272" r:id="rId14"/>
-    <p:sldId id="273" r:id="rId15"/>
-    <p:sldId id="260" r:id="rId16"/>
-    <p:sldId id="263" r:id="rId17"/>
-    <p:sldId id="267" r:id="rId18"/>
+    <p:sldId id="257" r:id="rId3"/>
+    <p:sldId id="261" r:id="rId4"/>
+    <p:sldId id="264" r:id="rId5"/>
+    <p:sldId id="266" r:id="rId6"/>
+    <p:sldId id="259" r:id="rId7"/>
+    <p:sldId id="262" r:id="rId8"/>
+    <p:sldId id="268" r:id="rId9"/>
+    <p:sldId id="270" r:id="rId10"/>
+    <p:sldId id="269" r:id="rId11"/>
+    <p:sldId id="271" r:id="rId12"/>
+    <p:sldId id="272" r:id="rId13"/>
+    <p:sldId id="273" r:id="rId14"/>
+    <p:sldId id="260" r:id="rId15"/>
+    <p:sldId id="263" r:id="rId16"/>
+    <p:sldId id="274" r:id="rId17"/>
+    <p:sldId id="275" r:id="rId18"/>
+    <p:sldId id="267" r:id="rId19"/>
   </p:sldIdLst>
   <p:sldSz cx="9144000" cy="6858000" type="screen4x3"/>
   <p:notesSz cx="6858000" cy="9144000"/>
@@ -311,7 +312,7 @@
           <a:p>
             <a:fld id="{E90ED720-0104-4369-84BC-D37694168613}" type="datetimeFigureOut">
               <a:rPr kumimoji="1" lang="ja-JP" altLang="en-US" smtClean="0"/>
-              <a:t>2015/7/31</a:t>
+              <a:t>2015/8/3</a:t>
             </a:fld>
             <a:endParaRPr kumimoji="1" lang="ja-JP" altLang="en-US"/>
           </a:p>
@@ -550,7 +551,7 @@
           <a:p>
             <a:fld id="{E90ED720-0104-4369-84BC-D37694168613}" type="datetimeFigureOut">
               <a:rPr kumimoji="1" lang="ja-JP" altLang="en-US" smtClean="0"/>
-              <a:t>2015/7/31</a:t>
+              <a:t>2015/8/3</a:t>
             </a:fld>
             <a:endParaRPr kumimoji="1" lang="ja-JP" altLang="en-US"/>
           </a:p>
@@ -757,7 +758,7 @@
           <a:p>
             <a:fld id="{E90ED720-0104-4369-84BC-D37694168613}" type="datetimeFigureOut">
               <a:rPr kumimoji="1" lang="ja-JP" altLang="en-US" smtClean="0"/>
-              <a:t>2015/7/31</a:t>
+              <a:t>2015/8/3</a:t>
             </a:fld>
             <a:endParaRPr kumimoji="1" lang="ja-JP" altLang="en-US"/>
           </a:p>
@@ -958,7 +959,7 @@
           <a:p>
             <a:fld id="{E90ED720-0104-4369-84BC-D37694168613}" type="datetimeFigureOut">
               <a:rPr kumimoji="1" lang="ja-JP" altLang="en-US" smtClean="0"/>
-              <a:t>2015/7/31</a:t>
+              <a:t>2015/8/3</a:t>
             </a:fld>
             <a:endParaRPr kumimoji="1" lang="ja-JP" altLang="en-US"/>
           </a:p>
@@ -1213,7 +1214,7 @@
           <a:p>
             <a:fld id="{E90ED720-0104-4369-84BC-D37694168613}" type="datetimeFigureOut">
               <a:rPr kumimoji="1" lang="ja-JP" altLang="en-US" smtClean="0"/>
-              <a:t>2015/7/31</a:t>
+              <a:t>2015/8/3</a:t>
             </a:fld>
             <a:endParaRPr kumimoji="1" lang="ja-JP" altLang="en-US"/>
           </a:p>
@@ -1602,7 +1603,7 @@
           <a:p>
             <a:fld id="{E90ED720-0104-4369-84BC-D37694168613}" type="datetimeFigureOut">
               <a:rPr kumimoji="1" lang="ja-JP" altLang="en-US" smtClean="0"/>
-              <a:t>2015/7/31</a:t>
+              <a:t>2015/8/3</a:t>
             </a:fld>
             <a:endParaRPr kumimoji="1" lang="ja-JP" altLang="en-US"/>
           </a:p>
@@ -2132,7 +2133,7 @@
           <a:p>
             <a:fld id="{E90ED720-0104-4369-84BC-D37694168613}" type="datetimeFigureOut">
               <a:rPr kumimoji="1" lang="ja-JP" altLang="en-US" smtClean="0"/>
-              <a:t>2015/7/31</a:t>
+              <a:t>2015/8/3</a:t>
             </a:fld>
             <a:endParaRPr kumimoji="1" lang="ja-JP" altLang="en-US"/>
           </a:p>
@@ -2280,7 +2281,7 @@
           <a:p>
             <a:fld id="{E90ED720-0104-4369-84BC-D37694168613}" type="datetimeFigureOut">
               <a:rPr kumimoji="1" lang="ja-JP" altLang="en-US" smtClean="0"/>
-              <a:t>2015/7/31</a:t>
+              <a:t>2015/8/3</a:t>
             </a:fld>
             <a:endParaRPr kumimoji="1" lang="ja-JP" altLang="en-US"/>
           </a:p>
@@ -2370,7 +2371,7 @@
           <a:p>
             <a:fld id="{E90ED720-0104-4369-84BC-D37694168613}" type="datetimeFigureOut">
               <a:rPr kumimoji="1" lang="ja-JP" altLang="en-US" smtClean="0"/>
-              <a:t>2015/7/31</a:t>
+              <a:t>2015/8/3</a:t>
             </a:fld>
             <a:endParaRPr kumimoji="1" lang="ja-JP" altLang="en-US"/>
           </a:p>
@@ -2676,7 +2677,7 @@
           <a:p>
             <a:fld id="{E90ED720-0104-4369-84BC-D37694168613}" type="datetimeFigureOut">
               <a:rPr kumimoji="1" lang="ja-JP" altLang="en-US" smtClean="0"/>
-              <a:t>2015/7/31</a:t>
+              <a:t>2015/8/3</a:t>
             </a:fld>
             <a:endParaRPr kumimoji="1" lang="ja-JP" altLang="en-US"/>
           </a:p>
@@ -2981,7 +2982,7 @@
           <a:p>
             <a:fld id="{E90ED720-0104-4369-84BC-D37694168613}" type="datetimeFigureOut">
               <a:rPr kumimoji="1" lang="ja-JP" altLang="en-US" smtClean="0"/>
-              <a:t>2015/7/31</a:t>
+              <a:t>2015/8/3</a:t>
             </a:fld>
             <a:endParaRPr kumimoji="1" lang="ja-JP" altLang="en-US"/>
           </a:p>
@@ -3318,7 +3319,7 @@
           <a:p>
             <a:fld id="{E90ED720-0104-4369-84BC-D37694168613}" type="datetimeFigureOut">
               <a:rPr kumimoji="1" lang="ja-JP" altLang="en-US" smtClean="0"/>
-              <a:t>2015/7/31</a:t>
+              <a:t>2015/8/3</a:t>
             </a:fld>
             <a:endParaRPr kumimoji="1" lang="ja-JP" altLang="en-US"/>
           </a:p>
@@ -3866,157 +3867,6 @@
           <a:bodyPr/>
           <a:lstStyle/>
           <a:p>
-            <a:pPr marL="514350" indent="-514350">
-              <a:buFont typeface="+mj-lt"/>
-              <a:buAutoNum type="arabicPeriod" startAt="3"/>
-            </a:pPr>
-            <a:r>
-              <a:rPr kumimoji="1" lang="en-US" altLang="ja-JP" dirty="0" smtClean="0"/>
-              <a:t>From apple_production.csv</a:t>
-            </a:r>
-            <a:r>
-              <a:rPr lang="en-US" altLang="ja-JP" dirty="0"/>
-              <a:t>, make a chart of apple production by </a:t>
-            </a:r>
-            <a:r>
-              <a:rPr lang="en-US" altLang="ja-JP" dirty="0" smtClean="0"/>
-              <a:t>years, like</a:t>
-            </a:r>
-            <a:endParaRPr kumimoji="1" lang="ja-JP" altLang="en-US" dirty="0"/>
-          </a:p>
-        </p:txBody>
-      </p:sp>
-      <p:pic>
-        <p:nvPicPr>
-          <p:cNvPr id="1026" name="Picture 2"/>
-          <p:cNvPicPr>
-            <a:picLocks noGrp="1" noChangeAspect="1" noChangeArrowheads="1"/>
-          </p:cNvPicPr>
-          <p:nvPr>
-            <p:ph sz="half" idx="2"/>
-          </p:nvPr>
-        </p:nvPicPr>
-        <p:blipFill>
-          <a:blip r:embed="rId2">
-            <a:extLst>
-              <a:ext uri="{28A0092B-C50C-407E-A947-70E740481C1C}">
-                <a14:useLocalDpi xmlns:a14="http://schemas.microsoft.com/office/drawing/2010/main" val="0"/>
-              </a:ext>
-            </a:extLst>
-          </a:blip>
-          <a:srcRect/>
-          <a:stretch>
-            <a:fillRect/>
-          </a:stretch>
-        </p:blipFill>
-        <p:spPr bwMode="auto">
-          <a:xfrm>
-            <a:off x="4648200" y="2416810"/>
-            <a:ext cx="4038600" cy="3230880"/>
-          </a:xfrm>
-          <a:prstGeom prst="rect">
-            <a:avLst/>
-          </a:prstGeom>
-          <a:noFill/>
-          <a:ln>
-            <a:noFill/>
-          </a:ln>
-          <a:extLst>
-            <a:ext uri="{909E8E84-426E-40DD-AFC4-6F175D3DCCD1}">
-              <a14:hiddenFill xmlns:a14="http://schemas.microsoft.com/office/drawing/2010/main">
-                <a:solidFill>
-                  <a:schemeClr val="accent1"/>
-                </a:solidFill>
-              </a14:hiddenFill>
-            </a:ext>
-            <a:ext uri="{91240B29-F687-4F45-9708-019B960494DF}">
-              <a14:hiddenLine xmlns:a14="http://schemas.microsoft.com/office/drawing/2010/main" w="9525">
-                <a:solidFill>
-                  <a:schemeClr val="tx1"/>
-                </a:solidFill>
-                <a:miter lim="800000"/>
-                <a:headEnd/>
-                <a:tailEnd/>
-              </a14:hiddenLine>
-            </a:ext>
-          </a:extLst>
-        </p:spPr>
-      </p:pic>
-    </p:spTree>
-    <p:extLst>
-      <p:ext uri="{BB962C8B-B14F-4D97-AF65-F5344CB8AC3E}">
-        <p14:creationId xmlns:p14="http://schemas.microsoft.com/office/powerpoint/2010/main" val="2116044513"/>
-      </p:ext>
-    </p:extLst>
-  </p:cSld>
-  <p:clrMapOvr>
-    <a:masterClrMapping/>
-  </p:clrMapOvr>
-  <p:timing>
-    <p:tnLst>
-      <p:par>
-        <p:cTn id="1" dur="indefinite" restart="never" nodeType="tmRoot"/>
-      </p:par>
-    </p:tnLst>
-  </p:timing>
-</p:sld>
-</file>
-
-<file path=ppt/slides/slide11.xml><?xml version="1.0" encoding="utf-8"?>
-<p:sld xmlns:a="http://schemas.openxmlformats.org/drawingml/2006/main" xmlns:r="http://schemas.openxmlformats.org/officeDocument/2006/relationships" xmlns:p="http://schemas.openxmlformats.org/presentationml/2006/main">
-  <p:cSld>
-    <p:spTree>
-      <p:nvGrpSpPr>
-        <p:cNvPr id="1" name=""/>
-        <p:cNvGrpSpPr/>
-        <p:nvPr/>
-      </p:nvGrpSpPr>
-      <p:grpSpPr>
-        <a:xfrm>
-          <a:off x="0" y="0"/>
-          <a:ext cx="0" cy="0"/>
-          <a:chOff x="0" y="0"/>
-          <a:chExt cx="0" cy="0"/>
-        </a:xfrm>
-      </p:grpSpPr>
-      <p:sp>
-        <p:nvSpPr>
-          <p:cNvPr id="2" name="タイトル 1"/>
-          <p:cNvSpPr>
-            <a:spLocks noGrp="1"/>
-          </p:cNvSpPr>
-          <p:nvPr>
-            <p:ph type="title"/>
-          </p:nvPr>
-        </p:nvSpPr>
-        <p:spPr/>
-        <p:txBody>
-          <a:bodyPr/>
-          <a:lstStyle/>
-          <a:p>
-            <a:r>
-              <a:rPr kumimoji="1" lang="en-US" altLang="ja-JP" dirty="0" smtClean="0"/>
-              <a:t>Practice 2</a:t>
-            </a:r>
-            <a:endParaRPr kumimoji="1" lang="ja-JP" altLang="en-US" dirty="0"/>
-          </a:p>
-        </p:txBody>
-      </p:sp>
-      <p:sp>
-        <p:nvSpPr>
-          <p:cNvPr id="3" name="コンテンツ プレースホルダー 2"/>
-          <p:cNvSpPr>
-            <a:spLocks noGrp="1"/>
-          </p:cNvSpPr>
-          <p:nvPr>
-            <p:ph sz="half" idx="1"/>
-          </p:nvPr>
-        </p:nvSpPr>
-        <p:spPr/>
-        <p:txBody>
-          <a:bodyPr/>
-          <a:lstStyle/>
-          <a:p>
             <a:pPr marL="457200" indent="-457200">
               <a:buFont typeface="+mj-lt"/>
               <a:buAutoNum type="arabicPeriod" startAt="4"/>
@@ -4117,7 +3967,7 @@
 </p:sld>
 </file>
 
-<file path=ppt/slides/slide12.xml><?xml version="1.0" encoding="utf-8"?>
+<file path=ppt/slides/slide11.xml><?xml version="1.0" encoding="utf-8"?>
 <p:sld xmlns:a="http://schemas.openxmlformats.org/drawingml/2006/main" xmlns:r="http://schemas.openxmlformats.org/officeDocument/2006/relationships" xmlns:p="http://schemas.openxmlformats.org/presentationml/2006/main">
   <p:cSld>
     <p:spTree>
@@ -4298,7 +4148,7 @@
 </p:sld>
 </file>
 
-<file path=ppt/slides/slide13.xml><?xml version="1.0" encoding="utf-8"?>
+<file path=ppt/slides/slide12.xml><?xml version="1.0" encoding="utf-8"?>
 <p:sld xmlns:a="http://schemas.openxmlformats.org/drawingml/2006/main" xmlns:r="http://schemas.openxmlformats.org/officeDocument/2006/relationships" xmlns:p="http://schemas.openxmlformats.org/presentationml/2006/main">
   <p:cSld>
     <p:spTree>
@@ -4469,7 +4319,7 @@
 </p:sld>
 </file>
 
-<file path=ppt/slides/slide14.xml><?xml version="1.0" encoding="utf-8"?>
+<file path=ppt/slides/slide13.xml><?xml version="1.0" encoding="utf-8"?>
 <p:sld xmlns:a="http://schemas.openxmlformats.org/drawingml/2006/main" xmlns:r="http://schemas.openxmlformats.org/officeDocument/2006/relationships" xmlns:p="http://schemas.openxmlformats.org/presentationml/2006/main">
   <p:cSld>
     <p:spTree>
@@ -4628,6 +4478,85 @@
 </p:sld>
 </file>
 
+<file path=ppt/slides/slide14.xml><?xml version="1.0" encoding="utf-8"?>
+<p:sld xmlns:a="http://schemas.openxmlformats.org/drawingml/2006/main" xmlns:r="http://schemas.openxmlformats.org/officeDocument/2006/relationships" xmlns:p="http://schemas.openxmlformats.org/presentationml/2006/main">
+  <p:cSld>
+    <p:spTree>
+      <p:nvGrpSpPr>
+        <p:cNvPr id="1" name=""/>
+        <p:cNvGrpSpPr/>
+        <p:nvPr/>
+      </p:nvGrpSpPr>
+      <p:grpSpPr>
+        <a:xfrm>
+          <a:off x="0" y="0"/>
+          <a:ext cx="0" cy="0"/>
+          <a:chOff x="0" y="0"/>
+          <a:chExt cx="0" cy="0"/>
+        </a:xfrm>
+      </p:grpSpPr>
+      <p:sp>
+        <p:nvSpPr>
+          <p:cNvPr id="2" name="タイトル 1"/>
+          <p:cNvSpPr>
+            <a:spLocks noGrp="1"/>
+          </p:cNvSpPr>
+          <p:nvPr>
+            <p:ph type="title"/>
+          </p:nvPr>
+        </p:nvSpPr>
+        <p:spPr/>
+        <p:txBody>
+          <a:bodyPr/>
+          <a:lstStyle/>
+          <a:p>
+            <a:r>
+              <a:rPr kumimoji="1" lang="en-US" altLang="ja-JP" dirty="0" smtClean="0"/>
+              <a:t>Programming</a:t>
+            </a:r>
+            <a:endParaRPr kumimoji="1" lang="ja-JP" altLang="en-US" dirty="0"/>
+          </a:p>
+        </p:txBody>
+      </p:sp>
+      <p:sp>
+        <p:nvSpPr>
+          <p:cNvPr id="3" name="テキスト プレースホルダー 2"/>
+          <p:cNvSpPr>
+            <a:spLocks noGrp="1"/>
+          </p:cNvSpPr>
+          <p:nvPr>
+            <p:ph type="body" idx="1"/>
+          </p:nvPr>
+        </p:nvSpPr>
+        <p:spPr/>
+        <p:txBody>
+          <a:bodyPr/>
+          <a:lstStyle/>
+          <a:p>
+            <a:endParaRPr kumimoji="1" lang="ja-JP" altLang="en-US"/>
+          </a:p>
+        </p:txBody>
+      </p:sp>
+    </p:spTree>
+    <p:extLst>
+      <p:ext uri="{BB962C8B-B14F-4D97-AF65-F5344CB8AC3E}">
+        <p14:creationId xmlns:p14="http://schemas.microsoft.com/office/powerpoint/2010/main" val="2768861996"/>
+      </p:ext>
+    </p:extLst>
+  </p:cSld>
+  <p:clrMapOvr>
+    <a:masterClrMapping/>
+  </p:clrMapOvr>
+  <p:timing>
+    <p:tnLst>
+      <p:par>
+        <p:cTn id="1" dur="indefinite" restart="never" nodeType="tmRoot"/>
+      </p:par>
+    </p:tnLst>
+  </p:timing>
+</p:sld>
+</file>
+
 <file path=ppt/slides/slide15.xml><?xml version="1.0" encoding="utf-8"?>
 <p:sld xmlns:a="http://schemas.openxmlformats.org/drawingml/2006/main" xmlns:r="http://schemas.openxmlformats.org/officeDocument/2006/relationships" xmlns:p="http://schemas.openxmlformats.org/presentationml/2006/main">
   <p:cSld>
@@ -4647,7 +4576,7 @@
       </p:grpSpPr>
       <p:sp>
         <p:nvSpPr>
-          <p:cNvPr id="2" name="タイトル 1"/>
+          <p:cNvPr id="4" name="タイトル 3"/>
           <p:cNvSpPr>
             <a:spLocks noGrp="1"/>
           </p:cNvSpPr>
@@ -4662,7 +4591,7 @@
           <a:p>
             <a:r>
               <a:rPr kumimoji="1" lang="en-US" altLang="ja-JP" dirty="0" smtClean="0"/>
-              <a:t>Programming</a:t>
+              <a:t>Practice 3</a:t>
             </a:r>
             <a:endParaRPr kumimoji="1" lang="ja-JP" altLang="en-US" dirty="0"/>
           </a:p>
@@ -4670,27 +4599,202 @@
       </p:sp>
       <p:sp>
         <p:nvSpPr>
-          <p:cNvPr id="3" name="テキスト プレースホルダー 2"/>
-          <p:cNvSpPr>
-            <a:spLocks noGrp="1"/>
-          </p:cNvSpPr>
-          <p:nvPr>
-            <p:ph type="body" idx="1"/>
-          </p:nvPr>
-        </p:nvSpPr>
-        <p:spPr/>
-        <p:txBody>
-          <a:bodyPr/>
-          <a:lstStyle/>
-          <a:p>
-            <a:endParaRPr kumimoji="1" lang="ja-JP" altLang="en-US"/>
+          <p:cNvPr id="5" name="コンテンツ プレースホルダー 4"/>
+          <p:cNvSpPr>
+            <a:spLocks noGrp="1"/>
+          </p:cNvSpPr>
+          <p:nvPr>
+            <p:ph idx="1"/>
+          </p:nvPr>
+        </p:nvSpPr>
+        <p:spPr/>
+        <p:txBody>
+          <a:bodyPr>
+            <a:normAutofit/>
+          </a:bodyPr>
+          <a:lstStyle/>
+          <a:p>
+            <a:pPr marL="457200" indent="-457200">
+              <a:buFont typeface="+mj-lt"/>
+              <a:buAutoNum type="arabicPeriod"/>
+            </a:pPr>
+            <a:r>
+              <a:rPr lang="en-US" altLang="ja-JP" dirty="0" smtClean="0"/>
+              <a:t>Scan </a:t>
+            </a:r>
+            <a:r>
+              <a:rPr lang="en-US" altLang="ja-JP" dirty="0"/>
+              <a:t>a number and find </a:t>
+            </a:r>
+            <a:r>
+              <a:rPr lang="en-US" altLang="ja-JP" dirty="0" smtClean="0"/>
+              <a:t>whether the </a:t>
+            </a:r>
+            <a:r>
+              <a:rPr lang="en-US" altLang="ja-JP" dirty="0"/>
+              <a:t>number is divisible by </a:t>
+            </a:r>
+            <a:r>
+              <a:rPr lang="en-US" altLang="ja-JP" dirty="0" smtClean="0"/>
+              <a:t>three or not</a:t>
+            </a:r>
+          </a:p>
+          <a:p>
+            <a:pPr lvl="1"/>
+            <a:r>
+              <a:rPr lang="en-US" altLang="ja-JP" dirty="0" smtClean="0"/>
+              <a:t>if </a:t>
+            </a:r>
+            <a:r>
+              <a:rPr lang="en-US" altLang="ja-JP" dirty="0"/>
+              <a:t>so, print 'divisible by </a:t>
+            </a:r>
+            <a:r>
+              <a:rPr lang="en-US" altLang="ja-JP" dirty="0" smtClean="0"/>
+              <a:t>three‘</a:t>
+            </a:r>
+          </a:p>
+          <a:p>
+            <a:pPr lvl="1"/>
+            <a:r>
+              <a:rPr lang="en-US" altLang="ja-JP" dirty="0" smtClean="0"/>
+              <a:t>if </a:t>
+            </a:r>
+            <a:r>
+              <a:rPr lang="en-US" altLang="ja-JP" dirty="0"/>
+              <a:t>not, print 'not divisible by </a:t>
+            </a:r>
+            <a:r>
+              <a:rPr lang="en-US" altLang="ja-JP" dirty="0" smtClean="0"/>
+              <a:t>three‘</a:t>
+            </a:r>
+          </a:p>
+          <a:p>
+            <a:pPr marL="457200" indent="-457200">
+              <a:buFont typeface="+mj-lt"/>
+              <a:buAutoNum type="arabicPeriod"/>
+            </a:pPr>
+            <a:r>
+              <a:rPr lang="en-US" altLang="ja-JP" dirty="0" smtClean="0"/>
+              <a:t>Scan </a:t>
+            </a:r>
+            <a:r>
+              <a:rPr lang="en-US" altLang="ja-JP" dirty="0"/>
+              <a:t>a number and find if the number is divisible by three and </a:t>
+            </a:r>
+            <a:r>
+              <a:rPr lang="en-US" altLang="ja-JP" dirty="0" smtClean="0"/>
+              <a:t>five</a:t>
+            </a:r>
+          </a:p>
+          <a:p>
+            <a:pPr marL="731520" lvl="1" indent="-457200">
+              <a:buFont typeface="+mj-lt"/>
+              <a:buAutoNum type="arabicPeriod"/>
+            </a:pPr>
+            <a:r>
+              <a:rPr lang="en-US" altLang="ja-JP" dirty="0" smtClean="0"/>
+              <a:t>if divisible </a:t>
+            </a:r>
+            <a:r>
+              <a:rPr lang="en-US" altLang="ja-JP" dirty="0"/>
+              <a:t>by only three, print 'divisible by </a:t>
+            </a:r>
+            <a:r>
+              <a:rPr lang="en-US" altLang="ja-JP" dirty="0" smtClean="0"/>
+              <a:t>three‘</a:t>
+            </a:r>
+          </a:p>
+          <a:p>
+            <a:pPr marL="731520" lvl="1" indent="-457200">
+              <a:buFont typeface="+mj-lt"/>
+              <a:buAutoNum type="arabicPeriod"/>
+            </a:pPr>
+            <a:r>
+              <a:rPr lang="en-US" altLang="ja-JP" dirty="0" smtClean="0"/>
+              <a:t>if </a:t>
+            </a:r>
+            <a:r>
+              <a:rPr lang="en-US" altLang="ja-JP" dirty="0"/>
+              <a:t>divisible by only five, print 'divisible by </a:t>
+            </a:r>
+            <a:r>
+              <a:rPr lang="en-US" altLang="ja-JP" dirty="0" smtClean="0"/>
+              <a:t>five‘</a:t>
+            </a:r>
+          </a:p>
+          <a:p>
+            <a:pPr marL="731520" lvl="1" indent="-457200">
+              <a:buFont typeface="+mj-lt"/>
+              <a:buAutoNum type="arabicPeriod"/>
+            </a:pPr>
+            <a:r>
+              <a:rPr lang="en-US" altLang="ja-JP" dirty="0" smtClean="0"/>
+              <a:t>if </a:t>
+            </a:r>
+            <a:r>
+              <a:rPr lang="en-US" altLang="ja-JP" dirty="0"/>
+              <a:t>divisible by three and five, print 'divisible by three and </a:t>
+            </a:r>
+            <a:r>
+              <a:rPr lang="en-US" altLang="ja-JP" dirty="0" smtClean="0"/>
+              <a:t>five‘</a:t>
+            </a:r>
+          </a:p>
+          <a:p>
+            <a:pPr marL="731520" lvl="1" indent="-457200">
+              <a:buFont typeface="+mj-lt"/>
+              <a:buAutoNum type="arabicPeriod"/>
+            </a:pPr>
+            <a:r>
+              <a:rPr lang="en-US" altLang="ja-JP" dirty="0" smtClean="0"/>
+              <a:t>if </a:t>
+            </a:r>
+            <a:r>
+              <a:rPr lang="en-US" altLang="ja-JP" dirty="0"/>
+              <a:t>divisible by </a:t>
+            </a:r>
+            <a:r>
+              <a:rPr lang="en-US" altLang="ja-JP" dirty="0" smtClean="0"/>
+              <a:t>neither three </a:t>
+            </a:r>
+            <a:r>
+              <a:rPr lang="en-US" altLang="ja-JP" dirty="0"/>
+              <a:t>nor </a:t>
+            </a:r>
+            <a:r>
+              <a:rPr lang="en-US" altLang="ja-JP" dirty="0" smtClean="0"/>
+              <a:t>five, print </a:t>
+            </a:r>
+            <a:r>
+              <a:rPr lang="en-US" altLang="ja-JP" dirty="0"/>
+              <a:t>'not divisible by three and </a:t>
+            </a:r>
+            <a:r>
+              <a:rPr lang="en-US" altLang="ja-JP" dirty="0" smtClean="0"/>
+              <a:t>five‘</a:t>
+            </a:r>
+          </a:p>
+          <a:p>
+            <a:pPr marL="457200" indent="-457200">
+              <a:buFont typeface="+mj-lt"/>
+              <a:buAutoNum type="arabicPeriod"/>
+            </a:pPr>
+            <a:endParaRPr kumimoji="1" lang="en-US" altLang="ja-JP" dirty="0" smtClean="0"/>
+          </a:p>
+          <a:p>
+            <a:pPr marL="457200" indent="-457200">
+              <a:buFont typeface="+mj-lt"/>
+              <a:buAutoNum type="arabicPeriod"/>
+            </a:pPr>
+            <a:endParaRPr kumimoji="1" lang="ja-JP" altLang="en-US" dirty="0"/>
           </a:p>
         </p:txBody>
       </p:sp>
     </p:spTree>
     <p:extLst>
       <p:ext uri="{BB962C8B-B14F-4D97-AF65-F5344CB8AC3E}">
-        <p14:creationId xmlns:p14="http://schemas.microsoft.com/office/powerpoint/2010/main" val="2768861996"/>
+        <p14:creationId xmlns:p14="http://schemas.microsoft.com/office/powerpoint/2010/main" val="1359815137"/>
       </p:ext>
     </p:extLst>
   </p:cSld>
@@ -4726,7 +4830,7 @@
       </p:grpSpPr>
       <p:sp>
         <p:nvSpPr>
-          <p:cNvPr id="4" name="タイトル 3"/>
+          <p:cNvPr id="2" name="タイトル 1"/>
           <p:cNvSpPr>
             <a:spLocks noGrp="1"/>
           </p:cNvSpPr>
@@ -4739,13 +4843,17 @@
           <a:bodyPr/>
           <a:lstStyle/>
           <a:p>
-            <a:endParaRPr kumimoji="1" lang="ja-JP" altLang="en-US"/>
-          </a:p>
-        </p:txBody>
-      </p:sp>
-      <p:sp>
-        <p:nvSpPr>
-          <p:cNvPr id="5" name="コンテンツ プレースホルダー 4"/>
+            <a:r>
+              <a:rPr kumimoji="1" lang="en-US" altLang="ja-JP" dirty="0" smtClean="0"/>
+              <a:t>Practice 3</a:t>
+            </a:r>
+            <a:endParaRPr kumimoji="1" lang="ja-JP" altLang="en-US" dirty="0"/>
+          </a:p>
+        </p:txBody>
+      </p:sp>
+      <p:sp>
+        <p:nvSpPr>
+          <p:cNvPr id="3" name="コンテンツ プレースホルダー 2"/>
           <p:cNvSpPr>
             <a:spLocks noGrp="1"/>
           </p:cNvSpPr>
@@ -4758,14 +4866,216 @@
           <a:bodyPr/>
           <a:lstStyle/>
           <a:p>
-            <a:endParaRPr kumimoji="1" lang="ja-JP" altLang="en-US"/>
+            <a:pPr marL="457200" indent="-457200">
+              <a:buFont typeface="+mj-lt"/>
+              <a:buAutoNum type="arabicPeriod" startAt="3"/>
+            </a:pPr>
+            <a:r>
+              <a:rPr lang="en-US" altLang="ja-JP" dirty="0" smtClean="0"/>
+              <a:t>With </a:t>
+            </a:r>
+            <a:r>
+              <a:rPr lang="en-US" altLang="ja-JP" dirty="0"/>
+              <a:t>for statement and vector c('</a:t>
+            </a:r>
+            <a:r>
+              <a:rPr lang="en-US" altLang="ja-JP" dirty="0" err="1"/>
+              <a:t>fuji</a:t>
+            </a:r>
+            <a:r>
+              <a:rPr lang="en-US" altLang="ja-JP" dirty="0"/>
+              <a:t>', '</a:t>
+            </a:r>
+            <a:r>
+              <a:rPr lang="en-US" altLang="ja-JP" dirty="0" err="1"/>
+              <a:t>orin</a:t>
+            </a:r>
+            <a:r>
+              <a:rPr lang="en-US" altLang="ja-JP" dirty="0" smtClean="0"/>
+              <a:t>'), print </a:t>
+            </a:r>
+            <a:r>
+              <a:rPr lang="en-US" altLang="ja-JP" dirty="0"/>
+              <a:t>'delicious </a:t>
+            </a:r>
+            <a:r>
+              <a:rPr lang="en-US" altLang="ja-JP" dirty="0" err="1"/>
+              <a:t>fuji</a:t>
+            </a:r>
+            <a:r>
+              <a:rPr lang="en-US" altLang="ja-JP" dirty="0"/>
+              <a:t>' and 'delicious </a:t>
+            </a:r>
+            <a:r>
+              <a:rPr lang="en-US" altLang="ja-JP" dirty="0" err="1" smtClean="0"/>
+              <a:t>orin</a:t>
+            </a:r>
+            <a:r>
+              <a:rPr lang="en-US" altLang="ja-JP" dirty="0"/>
+              <a:t>'.</a:t>
+            </a:r>
+          </a:p>
+          <a:p>
+            <a:pPr lvl="1"/>
+            <a:r>
+              <a:rPr lang="en-US" altLang="ja-JP" dirty="0" smtClean="0"/>
+              <a:t>Hint</a:t>
+            </a:r>
+            <a:r>
+              <a:rPr lang="en-US" altLang="ja-JP" dirty="0"/>
+              <a:t>: for string concatenation, use paste('foo', 'bar').</a:t>
+            </a:r>
+          </a:p>
+          <a:p>
+            <a:pPr marL="457200" indent="-457200">
+              <a:buFont typeface="+mj-lt"/>
+              <a:buAutoNum type="arabicPeriod" startAt="3"/>
+            </a:pPr>
+            <a:r>
+              <a:rPr lang="en-US" altLang="ja-JP" dirty="0" smtClean="0"/>
+              <a:t>With </a:t>
+            </a:r>
+            <a:r>
+              <a:rPr lang="en-US" altLang="ja-JP" dirty="0"/>
+              <a:t>while statement</a:t>
+            </a:r>
+            <a:r>
+              <a:rPr lang="en-US" altLang="ja-JP" dirty="0" smtClean="0"/>
+              <a:t>, ask </a:t>
+            </a:r>
+            <a:r>
+              <a:rPr lang="en-US" altLang="ja-JP" dirty="0"/>
+              <a:t>a number </a:t>
+            </a:r>
+            <a:r>
+              <a:rPr lang="en-US" altLang="ja-JP" dirty="0" smtClean="0"/>
+              <a:t>till it </a:t>
+            </a:r>
+            <a:r>
+              <a:rPr lang="en-US" altLang="ja-JP" dirty="0"/>
+              <a:t>is divisible by 3</a:t>
+            </a:r>
+          </a:p>
+          <a:p>
+            <a:pPr marL="457200" indent="-457200">
+              <a:buFont typeface="+mj-lt"/>
+              <a:buAutoNum type="arabicPeriod" startAt="3"/>
+            </a:pPr>
+            <a:r>
+              <a:rPr kumimoji="1" lang="en-US" altLang="ja-JP" dirty="0" smtClean="0"/>
+              <a:t>(</a:t>
+            </a:r>
+            <a:r>
+              <a:rPr kumimoji="1" lang="en-US" altLang="ja-JP" dirty="0" err="1" smtClean="0"/>
+              <a:t>FizzBuzz</a:t>
+            </a:r>
+            <a:r>
+              <a:rPr lang="en-US" altLang="ja-JP" dirty="0"/>
+              <a:t>) </a:t>
+            </a:r>
+            <a:r>
+              <a:rPr lang="en-US" altLang="ja-JP" dirty="0" smtClean="0"/>
+              <a:t>For </a:t>
+            </a:r>
+            <a:r>
+              <a:rPr lang="en-US" altLang="ja-JP" dirty="0"/>
+              <a:t>number between 1 and </a:t>
+            </a:r>
+            <a:r>
+              <a:rPr lang="en-US" altLang="ja-JP" dirty="0" smtClean="0"/>
+              <a:t>100,</a:t>
+            </a:r>
+          </a:p>
+          <a:p>
+            <a:pPr lvl="1"/>
+            <a:r>
+              <a:rPr lang="en-US" altLang="ja-JP" dirty="0" smtClean="0"/>
+              <a:t>print </a:t>
+            </a:r>
+            <a:r>
+              <a:rPr lang="en-US" altLang="ja-JP" dirty="0"/>
+              <a:t>fizz if it is divisible by </a:t>
+            </a:r>
+            <a:r>
+              <a:rPr lang="en-US" altLang="ja-JP" dirty="0" smtClean="0"/>
+              <a:t>3</a:t>
+            </a:r>
+          </a:p>
+          <a:p>
+            <a:pPr lvl="1"/>
+            <a:r>
+              <a:rPr lang="en-US" altLang="ja-JP" dirty="0" smtClean="0"/>
+              <a:t>print </a:t>
+            </a:r>
+            <a:r>
+              <a:rPr lang="en-US" altLang="ja-JP" dirty="0"/>
+              <a:t>buzz if it is divisible by </a:t>
+            </a:r>
+            <a:r>
+              <a:rPr lang="en-US" altLang="ja-JP" dirty="0" smtClean="0"/>
+              <a:t>5</a:t>
+            </a:r>
+          </a:p>
+          <a:p>
+            <a:pPr lvl="1"/>
+            <a:r>
+              <a:rPr lang="en-US" altLang="ja-JP" dirty="0" smtClean="0"/>
+              <a:t>print </a:t>
+            </a:r>
+            <a:r>
+              <a:rPr lang="en-US" altLang="ja-JP" dirty="0" err="1"/>
+              <a:t>fizzbuzz</a:t>
+            </a:r>
+            <a:r>
+              <a:rPr lang="en-US" altLang="ja-JP" dirty="0"/>
+              <a:t> if it is divisible by both 3 and </a:t>
+            </a:r>
+            <a:r>
+              <a:rPr lang="en-US" altLang="ja-JP" dirty="0" smtClean="0"/>
+              <a:t>5</a:t>
+            </a:r>
+          </a:p>
+          <a:p>
+            <a:pPr lvl="1"/>
+            <a:r>
+              <a:rPr lang="en-US" altLang="ja-JP" dirty="0" smtClean="0"/>
+              <a:t>print </a:t>
+            </a:r>
+            <a:r>
+              <a:rPr lang="en-US" altLang="ja-JP" dirty="0"/>
+              <a:t>the number if is not divisible by both 3 and </a:t>
+            </a:r>
+            <a:r>
+              <a:rPr lang="en-US" altLang="ja-JP" dirty="0" smtClean="0"/>
+              <a:t>5</a:t>
+            </a:r>
+          </a:p>
+          <a:p>
+            <a:pPr marL="0" indent="0">
+              <a:buNone/>
+            </a:pPr>
+            <a:r>
+              <a:rPr lang="en-US" altLang="ja-JP" dirty="0" smtClean="0"/>
+              <a:t>i.e. 1 </a:t>
+            </a:r>
+            <a:r>
+              <a:rPr lang="en-US" altLang="ja-JP" dirty="0"/>
+              <a:t>2 fizz 4 buzz fizz 7 8 fizz buzz...</a:t>
+            </a:r>
+          </a:p>
+          <a:p>
+            <a:pPr marL="457200" indent="-457200">
+              <a:buFont typeface="+mj-lt"/>
+              <a:buAutoNum type="arabicPeriod" startAt="3"/>
+            </a:pPr>
+            <a:endParaRPr kumimoji="1" lang="ja-JP" altLang="en-US" dirty="0"/>
           </a:p>
         </p:txBody>
       </p:sp>
     </p:spTree>
     <p:extLst>
       <p:ext uri="{BB962C8B-B14F-4D97-AF65-F5344CB8AC3E}">
-        <p14:creationId xmlns:p14="http://schemas.microsoft.com/office/powerpoint/2010/main" val="1359815137"/>
+        <p14:creationId xmlns:p14="http://schemas.microsoft.com/office/powerpoint/2010/main" val="2385431312"/>
       </p:ext>
     </p:extLst>
   </p:cSld>
@@ -4783,6 +5093,242 @@
 </file>
 
 <file path=ppt/slides/slide17.xml><?xml version="1.0" encoding="utf-8"?>
+<p:sld xmlns:a="http://schemas.openxmlformats.org/drawingml/2006/main" xmlns:r="http://schemas.openxmlformats.org/officeDocument/2006/relationships" xmlns:p="http://schemas.openxmlformats.org/presentationml/2006/main">
+  <p:cSld>
+    <p:spTree>
+      <p:nvGrpSpPr>
+        <p:cNvPr id="1" name=""/>
+        <p:cNvGrpSpPr/>
+        <p:nvPr/>
+      </p:nvGrpSpPr>
+      <p:grpSpPr>
+        <a:xfrm>
+          <a:off x="0" y="0"/>
+          <a:ext cx="0" cy="0"/>
+          <a:chOff x="0" y="0"/>
+          <a:chExt cx="0" cy="0"/>
+        </a:xfrm>
+      </p:grpSpPr>
+      <p:sp>
+        <p:nvSpPr>
+          <p:cNvPr id="2" name="タイトル 1"/>
+          <p:cNvSpPr>
+            <a:spLocks noGrp="1"/>
+          </p:cNvSpPr>
+          <p:nvPr>
+            <p:ph type="title"/>
+          </p:nvPr>
+        </p:nvSpPr>
+        <p:spPr/>
+        <p:txBody>
+          <a:bodyPr/>
+          <a:lstStyle/>
+          <a:p>
+            <a:r>
+              <a:rPr kumimoji="1" lang="en-US" altLang="ja-JP" dirty="0" smtClean="0"/>
+              <a:t>Practice 3(advanced)</a:t>
+            </a:r>
+            <a:endParaRPr kumimoji="1" lang="ja-JP" altLang="en-US" dirty="0"/>
+          </a:p>
+        </p:txBody>
+      </p:sp>
+      <p:sp>
+        <p:nvSpPr>
+          <p:cNvPr id="3" name="コンテンツ プレースホルダー 2"/>
+          <p:cNvSpPr>
+            <a:spLocks noGrp="1"/>
+          </p:cNvSpPr>
+          <p:nvPr>
+            <p:ph idx="1"/>
+          </p:nvPr>
+        </p:nvSpPr>
+        <p:spPr/>
+        <p:txBody>
+          <a:bodyPr/>
+          <a:lstStyle/>
+          <a:p>
+            <a:pPr marL="457200" indent="-457200">
+              <a:buFont typeface="+mj-lt"/>
+              <a:buAutoNum type="arabicPeriod" startAt="6"/>
+            </a:pPr>
+            <a:r>
+              <a:rPr lang="en-US" altLang="ja-JP" dirty="0" smtClean="0"/>
+              <a:t>Make </a:t>
+            </a:r>
+            <a:r>
+              <a:rPr lang="en-US" altLang="ja-JP" dirty="0"/>
+              <a:t>a function which you pass a word </a:t>
+            </a:r>
+            <a:r>
+              <a:rPr lang="en-US" altLang="ja-JP" dirty="0" smtClean="0"/>
+              <a:t>and returns </a:t>
+            </a:r>
+            <a:r>
+              <a:rPr lang="en-US" altLang="ja-JP" dirty="0"/>
+              <a:t>'delicious &lt;your word</a:t>
+            </a:r>
+            <a:r>
+              <a:rPr lang="en-US" altLang="ja-JP" dirty="0" smtClean="0"/>
+              <a:t>&gt;'. And </a:t>
+            </a:r>
+            <a:r>
+              <a:rPr lang="en-US" altLang="ja-JP" dirty="0"/>
+              <a:t>try </a:t>
+            </a:r>
+            <a:r>
+              <a:rPr lang="en-US" altLang="ja-JP" dirty="0" smtClean="0"/>
+              <a:t>the function </a:t>
+            </a:r>
+            <a:r>
+              <a:rPr lang="en-US" altLang="ja-JP" dirty="0"/>
+              <a:t>with some words</a:t>
+            </a:r>
+            <a:r>
+              <a:rPr lang="en-US" altLang="ja-JP" dirty="0" smtClean="0"/>
+              <a:t>.</a:t>
+            </a:r>
+          </a:p>
+          <a:p>
+            <a:pPr lvl="1"/>
+            <a:r>
+              <a:rPr lang="en-US" altLang="ja-JP" dirty="0" smtClean="0"/>
+              <a:t>Hint: use paste(‘delicious’, ‘your word’)</a:t>
+            </a:r>
+          </a:p>
+          <a:p>
+            <a:pPr marL="457200" indent="-457200">
+              <a:buFont typeface="+mj-lt"/>
+              <a:buAutoNum type="arabicPeriod" startAt="6"/>
+            </a:pPr>
+            <a:r>
+              <a:rPr lang="en-US" altLang="ja-JP" dirty="0"/>
+              <a:t>F</a:t>
+            </a:r>
+            <a:r>
+              <a:rPr lang="en-US" altLang="ja-JP" dirty="0" smtClean="0"/>
+              <a:t>or </a:t>
+            </a:r>
+            <a:r>
+              <a:rPr lang="en-US" altLang="ja-JP" dirty="0"/>
+              <a:t>vector, c('</a:t>
+            </a:r>
+            <a:r>
+              <a:rPr lang="en-US" altLang="ja-JP" dirty="0" err="1"/>
+              <a:t>fuji</a:t>
+            </a:r>
+            <a:r>
+              <a:rPr lang="en-US" altLang="ja-JP" dirty="0"/>
+              <a:t>', </a:t>
+            </a:r>
+            <a:r>
+              <a:rPr lang="en-US" altLang="ja-JP" dirty="0" smtClean="0"/>
+              <a:t>'</a:t>
+            </a:r>
+            <a:r>
+              <a:rPr lang="en-US" altLang="ja-JP" dirty="0" err="1" smtClean="0"/>
+              <a:t>orin</a:t>
+            </a:r>
+            <a:r>
+              <a:rPr lang="en-US" altLang="ja-JP" dirty="0"/>
+              <a:t>', </a:t>
+            </a:r>
+            <a:r>
+              <a:rPr lang="en-US" altLang="ja-JP" dirty="0" smtClean="0"/>
+              <a:t>...), create </a:t>
+            </a:r>
+            <a:r>
+              <a:rPr lang="en-US" altLang="ja-JP" dirty="0"/>
+              <a:t>a vector c('delicious </a:t>
+            </a:r>
+            <a:r>
+              <a:rPr lang="en-US" altLang="ja-JP" dirty="0" err="1"/>
+              <a:t>fuji</a:t>
+            </a:r>
+            <a:r>
+              <a:rPr lang="en-US" altLang="ja-JP" dirty="0"/>
+              <a:t>', 'delicious </a:t>
+            </a:r>
+            <a:r>
+              <a:rPr lang="en-US" altLang="ja-JP" dirty="0" err="1"/>
+              <a:t>orin</a:t>
+            </a:r>
+            <a:r>
+              <a:rPr lang="en-US" altLang="ja-JP" dirty="0"/>
+              <a:t>', 'delicious </a:t>
+            </a:r>
+            <a:r>
+              <a:rPr lang="en-US" altLang="ja-JP" dirty="0" smtClean="0"/>
+              <a:t>...')</a:t>
+            </a:r>
+          </a:p>
+          <a:p>
+            <a:pPr lvl="1"/>
+            <a:r>
+              <a:rPr lang="en-US" altLang="ja-JP" dirty="0" smtClean="0"/>
+              <a:t>with </a:t>
+            </a:r>
+            <a:r>
+              <a:rPr lang="en-US" altLang="ja-JP" dirty="0"/>
+              <a:t>function f = paste('delicious', x</a:t>
+            </a:r>
+            <a:r>
+              <a:rPr lang="en-US" altLang="ja-JP" dirty="0" smtClean="0"/>
+              <a:t>)</a:t>
+            </a:r>
+          </a:p>
+          <a:p>
+            <a:pPr lvl="1"/>
+            <a:r>
+              <a:rPr lang="en-US" altLang="ja-JP" dirty="0" err="1" smtClean="0"/>
+              <a:t>sapply</a:t>
+            </a:r>
+            <a:r>
+              <a:rPr lang="en-US" altLang="ja-JP" dirty="0" smtClean="0"/>
+              <a:t> </a:t>
+            </a:r>
+            <a:r>
+              <a:rPr lang="en-US" altLang="ja-JP" dirty="0"/>
+              <a:t>function(see help(</a:t>
+            </a:r>
+            <a:r>
+              <a:rPr lang="en-US" altLang="ja-JP" dirty="0" err="1"/>
+              <a:t>sapply</a:t>
+            </a:r>
+            <a:r>
+              <a:rPr lang="en-US" altLang="ja-JP" dirty="0"/>
+              <a:t>))</a:t>
+            </a:r>
+          </a:p>
+          <a:p>
+            <a:pPr marL="457200" indent="-457200">
+              <a:buFont typeface="+mj-lt"/>
+              <a:buAutoNum type="arabicPeriod" startAt="6"/>
+            </a:pPr>
+            <a:endParaRPr lang="en-US" altLang="ja-JP" dirty="0"/>
+          </a:p>
+        </p:txBody>
+      </p:sp>
+    </p:spTree>
+    <p:extLst>
+      <p:ext uri="{BB962C8B-B14F-4D97-AF65-F5344CB8AC3E}">
+        <p14:creationId xmlns:p14="http://schemas.microsoft.com/office/powerpoint/2010/main" val="4162696292"/>
+      </p:ext>
+    </p:extLst>
+  </p:cSld>
+  <p:clrMapOvr>
+    <a:masterClrMapping/>
+  </p:clrMapOvr>
+  <p:timing>
+    <p:tnLst>
+      <p:par>
+        <p:cTn id="1" dur="indefinite" restart="never" nodeType="tmRoot"/>
+      </p:par>
+    </p:tnLst>
+  </p:timing>
+</p:sld>
+</file>
+
+<file path=ppt/slides/slide18.xml><?xml version="1.0" encoding="utf-8"?>
 <p:sld xmlns:a="http://schemas.openxmlformats.org/drawingml/2006/main" xmlns:r="http://schemas.openxmlformats.org/officeDocument/2006/relationships" xmlns:p="http://schemas.openxmlformats.org/presentationml/2006/main">
   <p:cSld>
     <p:spTree>
@@ -4925,7 +5471,7 @@
       </p:grpSpPr>
       <p:sp>
         <p:nvSpPr>
-          <p:cNvPr id="2" name="タイトル 1"/>
+          <p:cNvPr id="4" name="タイトル 3"/>
           <p:cNvSpPr>
             <a:spLocks noGrp="1"/>
           </p:cNvSpPr>
@@ -4940,11 +5486,7 @@
           <a:p>
             <a:r>
               <a:rPr kumimoji="1" lang="en-US" altLang="ja-JP" dirty="0" smtClean="0"/>
-              <a:t>How to use these </a:t>
-            </a:r>
-            <a:r>
-              <a:rPr lang="en-US" altLang="ja-JP" dirty="0" smtClean="0"/>
-              <a:t>practices</a:t>
+              <a:t>Basic operation</a:t>
             </a:r>
             <a:endParaRPr kumimoji="1" lang="ja-JP" altLang="en-US" dirty="0"/>
           </a:p>
@@ -4952,12 +5494,12 @@
       </p:sp>
       <p:sp>
         <p:nvSpPr>
-          <p:cNvPr id="3" name="コンテンツ プレースホルダー 2"/>
-          <p:cNvSpPr>
-            <a:spLocks noGrp="1"/>
-          </p:cNvSpPr>
-          <p:nvPr>
-            <p:ph idx="1"/>
+          <p:cNvPr id="5" name="テキスト プレースホルダー 4"/>
+          <p:cNvSpPr>
+            <a:spLocks noGrp="1"/>
+          </p:cNvSpPr>
+          <p:nvPr>
+            <p:ph type="body" idx="1"/>
           </p:nvPr>
         </p:nvSpPr>
         <p:spPr/>
@@ -4972,7 +5514,7 @@
     </p:spTree>
     <p:extLst>
       <p:ext uri="{BB962C8B-B14F-4D97-AF65-F5344CB8AC3E}">
-        <p14:creationId xmlns:p14="http://schemas.microsoft.com/office/powerpoint/2010/main" val="684462048"/>
+        <p14:creationId xmlns:p14="http://schemas.microsoft.com/office/powerpoint/2010/main" val="1622584769"/>
       </p:ext>
     </p:extLst>
   </p:cSld>
@@ -5023,7 +5565,7 @@
           <a:p>
             <a:r>
               <a:rPr kumimoji="1" lang="en-US" altLang="ja-JP" dirty="0" smtClean="0"/>
-              <a:t>Basic operation</a:t>
+              <a:t>Practice 1</a:t>
             </a:r>
             <a:endParaRPr kumimoji="1" lang="ja-JP" altLang="en-US" dirty="0"/>
           </a:p>
@@ -5031,27 +5573,160 @@
       </p:sp>
       <p:sp>
         <p:nvSpPr>
-          <p:cNvPr id="5" name="テキスト プレースホルダー 4"/>
-          <p:cNvSpPr>
-            <a:spLocks noGrp="1"/>
-          </p:cNvSpPr>
-          <p:nvPr>
-            <p:ph type="body" idx="1"/>
-          </p:nvPr>
-        </p:nvSpPr>
-        <p:spPr/>
-        <p:txBody>
-          <a:bodyPr/>
-          <a:lstStyle/>
-          <a:p>
-            <a:endParaRPr kumimoji="1" lang="ja-JP" altLang="en-US"/>
+          <p:cNvPr id="5" name="コンテンツ プレースホルダー 4"/>
+          <p:cNvSpPr>
+            <a:spLocks noGrp="1"/>
+          </p:cNvSpPr>
+          <p:nvPr>
+            <p:ph idx="1"/>
+          </p:nvPr>
+        </p:nvSpPr>
+        <p:spPr/>
+        <p:txBody>
+          <a:bodyPr/>
+          <a:lstStyle/>
+          <a:p>
+            <a:pPr marL="457200" indent="-457200">
+              <a:buFont typeface="+mj-lt"/>
+              <a:buAutoNum type="arabicPeriod"/>
+            </a:pPr>
+            <a:r>
+              <a:rPr kumimoji="1" lang="en-US" altLang="ja-JP" dirty="0" smtClean="0"/>
+              <a:t>Convert minutes into hours and minutes</a:t>
+            </a:r>
+          </a:p>
+          <a:p>
+            <a:pPr lvl="1"/>
+            <a:r>
+              <a:rPr lang="en-US" altLang="ja-JP" dirty="0"/>
+              <a:t>E.g. 123 -&gt; 2:03, 255 -&gt; </a:t>
+            </a:r>
+            <a:r>
+              <a:rPr lang="en-US" altLang="ja-JP" dirty="0" smtClean="0"/>
+              <a:t>4:15</a:t>
+            </a:r>
+          </a:p>
+          <a:p>
+            <a:pPr lvl="1"/>
+            <a:r>
+              <a:rPr kumimoji="1" lang="en-US" altLang="ja-JP" dirty="0" smtClean="0"/>
+              <a:t>Hint: use division and modulation</a:t>
+            </a:r>
+          </a:p>
+          <a:p>
+            <a:pPr marL="457200" indent="-457200">
+              <a:buFont typeface="+mj-lt"/>
+              <a:buAutoNum type="arabicPeriod"/>
+            </a:pPr>
+            <a:r>
+              <a:rPr kumimoji="1" lang="en-US" altLang="ja-JP" dirty="0" smtClean="0"/>
+              <a:t>Find the number of digits of a number</a:t>
+            </a:r>
+          </a:p>
+          <a:p>
+            <a:pPr lvl="1"/>
+            <a:r>
+              <a:rPr lang="en-US" altLang="ja-JP" dirty="0"/>
+              <a:t>E.g. 12345 -&gt; 5, 654321 -&gt; </a:t>
+            </a:r>
+            <a:r>
+              <a:rPr lang="en-US" altLang="ja-JP" dirty="0" smtClean="0"/>
+              <a:t>6</a:t>
+            </a:r>
+          </a:p>
+          <a:p>
+            <a:pPr lvl="1"/>
+            <a:r>
+              <a:rPr lang="de-DE" altLang="ja-JP" dirty="0" smtClean="0"/>
+              <a:t>Hint</a:t>
+            </a:r>
+            <a:r>
+              <a:rPr lang="de-DE" altLang="ja-JP" dirty="0"/>
+              <a:t>: 1-(10-1) -&gt; 1 digit 10-(100-1) -&gt; 2 digits </a:t>
+            </a:r>
+            <a:r>
+              <a:rPr lang="de-DE" altLang="ja-JP" dirty="0" smtClean="0"/>
+              <a:t>...</a:t>
+            </a:r>
+          </a:p>
+          <a:p>
+            <a:pPr lvl="1"/>
+            <a:r>
+              <a:rPr lang="en-US" altLang="ja-JP" dirty="0"/>
+              <a:t>Hint2: log10(1) = 0, log10(10) = 1, log10(100) = 2 </a:t>
+            </a:r>
+            <a:r>
+              <a:rPr lang="en-US" altLang="ja-JP" dirty="0" smtClean="0"/>
+              <a:t>...</a:t>
+            </a:r>
+          </a:p>
+          <a:p>
+            <a:pPr marL="457200" indent="-457200">
+              <a:buFont typeface="+mj-lt"/>
+              <a:buAutoNum type="arabicPeriod"/>
+            </a:pPr>
+            <a:r>
+              <a:rPr kumimoji="1" lang="en-US" altLang="ja-JP" dirty="0" smtClean="0"/>
+              <a:t>Find how many numbers which</a:t>
+            </a:r>
+          </a:p>
+          <a:p>
+            <a:pPr marL="731520" lvl="1" indent="-457200">
+              <a:buFont typeface="+mj-lt"/>
+              <a:buAutoNum type="arabicPeriod"/>
+            </a:pPr>
+            <a:r>
+              <a:rPr lang="en-US" altLang="ja-JP" dirty="0" smtClean="0"/>
+              <a:t>Divisible by three</a:t>
+            </a:r>
+          </a:p>
+          <a:p>
+            <a:pPr marL="731520" lvl="1" indent="-457200">
+              <a:buFont typeface="+mj-lt"/>
+              <a:buAutoNum type="arabicPeriod"/>
+            </a:pPr>
+            <a:r>
+              <a:rPr kumimoji="1" lang="en-US" altLang="ja-JP" dirty="0" smtClean="0"/>
+              <a:t>Smaller than 1000</a:t>
+            </a:r>
+          </a:p>
+          <a:p>
+            <a:pPr lvl="1"/>
+            <a:r>
+              <a:rPr lang="en-US" altLang="ja-JP" dirty="0" smtClean="0"/>
+              <a:t>Hint: colon operator (see help(‘:’))</a:t>
+            </a:r>
+          </a:p>
+          <a:p>
+            <a:pPr lvl="1"/>
+            <a:r>
+              <a:rPr kumimoji="1" lang="en-US" altLang="ja-JP" dirty="0" smtClean="0"/>
+              <a:t>Hint2</a:t>
+            </a:r>
+            <a:r>
+              <a:rPr lang="en-US" altLang="ja-JP" dirty="0"/>
+              <a:t>: length(): get </a:t>
+            </a:r>
+            <a:r>
+              <a:rPr lang="en-US" altLang="ja-JP" dirty="0" smtClean="0"/>
+              <a:t>length </a:t>
+            </a:r>
+            <a:r>
+              <a:rPr lang="en-US" altLang="ja-JP" dirty="0"/>
+              <a:t>of a </a:t>
+            </a:r>
+            <a:r>
+              <a:rPr lang="en-US" altLang="ja-JP" dirty="0" smtClean="0"/>
+              <a:t>vector (see help(length))</a:t>
+            </a:r>
+            <a:endParaRPr kumimoji="1" lang="ja-JP" altLang="en-US" dirty="0"/>
           </a:p>
         </p:txBody>
       </p:sp>
     </p:spTree>
     <p:extLst>
       <p:ext uri="{BB962C8B-B14F-4D97-AF65-F5344CB8AC3E}">
-        <p14:creationId xmlns:p14="http://schemas.microsoft.com/office/powerpoint/2010/main" val="1622584769"/>
+        <p14:creationId xmlns:p14="http://schemas.microsoft.com/office/powerpoint/2010/main" val="1788691327"/>
       </p:ext>
     </p:extLst>
   </p:cSld>
@@ -5087,7 +5762,7 @@
       </p:grpSpPr>
       <p:sp>
         <p:nvSpPr>
-          <p:cNvPr id="4" name="タイトル 3"/>
+          <p:cNvPr id="2" name="タイトル 1"/>
           <p:cNvSpPr>
             <a:spLocks noGrp="1"/>
           </p:cNvSpPr>
@@ -5108,220 +5783,8 @@
           </a:p>
         </p:txBody>
       </p:sp>
-      <p:sp>
-        <p:nvSpPr>
-          <p:cNvPr id="5" name="コンテンツ プレースホルダー 4"/>
-          <p:cNvSpPr>
-            <a:spLocks noGrp="1"/>
-          </p:cNvSpPr>
-          <p:nvPr>
-            <p:ph idx="1"/>
-          </p:nvPr>
-        </p:nvSpPr>
-        <p:spPr/>
-        <p:txBody>
-          <a:bodyPr/>
-          <a:lstStyle/>
-          <a:p>
-            <a:pPr marL="457200" indent="-457200">
-              <a:buFont typeface="+mj-lt"/>
-              <a:buAutoNum type="arabicPeriod"/>
-            </a:pPr>
-            <a:r>
-              <a:rPr kumimoji="1" lang="en-US" altLang="ja-JP" dirty="0" smtClean="0"/>
-              <a:t>Convert minutes into hours and minutes</a:t>
-            </a:r>
-          </a:p>
-          <a:p>
-            <a:pPr lvl="1"/>
-            <a:r>
-              <a:rPr lang="en-US" altLang="ja-JP" dirty="0"/>
-              <a:t>E.g. 123 -&gt; 2:03, 255 -&gt; </a:t>
-            </a:r>
-            <a:r>
-              <a:rPr lang="en-US" altLang="ja-JP" dirty="0" smtClean="0"/>
-              <a:t>4:15</a:t>
-            </a:r>
-          </a:p>
-          <a:p>
-            <a:pPr lvl="1"/>
-            <a:r>
-              <a:rPr kumimoji="1" lang="en-US" altLang="ja-JP" dirty="0" smtClean="0"/>
-              <a:t>Hint: use division and modulation</a:t>
-            </a:r>
-          </a:p>
-          <a:p>
-            <a:pPr marL="457200" indent="-457200">
-              <a:buFont typeface="+mj-lt"/>
-              <a:buAutoNum type="arabicPeriod"/>
-            </a:pPr>
-            <a:r>
-              <a:rPr kumimoji="1" lang="en-US" altLang="ja-JP" dirty="0" smtClean="0"/>
-              <a:t>Find the number of digits of a number</a:t>
-            </a:r>
-          </a:p>
-          <a:p>
-            <a:pPr lvl="1"/>
-            <a:r>
-              <a:rPr lang="en-US" altLang="ja-JP" dirty="0"/>
-              <a:t>E.g. 12345 -&gt; 5, 654321 -&gt; </a:t>
-            </a:r>
-            <a:r>
-              <a:rPr lang="en-US" altLang="ja-JP" dirty="0" smtClean="0"/>
-              <a:t>6</a:t>
-            </a:r>
-          </a:p>
-          <a:p>
-            <a:pPr lvl="1"/>
-            <a:r>
-              <a:rPr lang="de-DE" altLang="ja-JP" dirty="0" smtClean="0"/>
-              <a:t>Hint</a:t>
-            </a:r>
-            <a:r>
-              <a:rPr lang="de-DE" altLang="ja-JP" dirty="0"/>
-              <a:t>: 1-(10-1) -&gt; 1 digit 10-(100-1) -&gt; 2 digits </a:t>
-            </a:r>
-            <a:r>
-              <a:rPr lang="de-DE" altLang="ja-JP" dirty="0" smtClean="0"/>
-              <a:t>...</a:t>
-            </a:r>
-          </a:p>
-          <a:p>
-            <a:pPr lvl="1"/>
-            <a:r>
-              <a:rPr lang="en-US" altLang="ja-JP" dirty="0"/>
-              <a:t>Hint2: log10(1) = 0, log10(10) = 1, log10(100) = 2 </a:t>
-            </a:r>
-            <a:r>
-              <a:rPr lang="en-US" altLang="ja-JP" dirty="0" smtClean="0"/>
-              <a:t>...</a:t>
-            </a:r>
-          </a:p>
-          <a:p>
-            <a:pPr marL="457200" indent="-457200">
-              <a:buFont typeface="+mj-lt"/>
-              <a:buAutoNum type="arabicPeriod"/>
-            </a:pPr>
-            <a:r>
-              <a:rPr kumimoji="1" lang="en-US" altLang="ja-JP" dirty="0" smtClean="0"/>
-              <a:t>Find how many numbers which</a:t>
-            </a:r>
-          </a:p>
-          <a:p>
-            <a:pPr marL="731520" lvl="1" indent="-457200">
-              <a:buFont typeface="+mj-lt"/>
-              <a:buAutoNum type="arabicPeriod"/>
-            </a:pPr>
-            <a:r>
-              <a:rPr lang="en-US" altLang="ja-JP" dirty="0" smtClean="0"/>
-              <a:t>Divisible by three</a:t>
-            </a:r>
-          </a:p>
-          <a:p>
-            <a:pPr marL="731520" lvl="1" indent="-457200">
-              <a:buFont typeface="+mj-lt"/>
-              <a:buAutoNum type="arabicPeriod"/>
-            </a:pPr>
-            <a:r>
-              <a:rPr kumimoji="1" lang="en-US" altLang="ja-JP" dirty="0" smtClean="0"/>
-              <a:t>Smaller than 1000</a:t>
-            </a:r>
-          </a:p>
-          <a:p>
-            <a:pPr lvl="1"/>
-            <a:r>
-              <a:rPr lang="en-US" altLang="ja-JP" dirty="0" smtClean="0"/>
-              <a:t>Hint: colon operator (see help(‘:’))</a:t>
-            </a:r>
-          </a:p>
-          <a:p>
-            <a:pPr lvl="1"/>
-            <a:r>
-              <a:rPr kumimoji="1" lang="en-US" altLang="ja-JP" dirty="0" smtClean="0"/>
-              <a:t>Hint2</a:t>
-            </a:r>
-            <a:r>
-              <a:rPr lang="en-US" altLang="ja-JP" dirty="0"/>
-              <a:t>: length(): get </a:t>
-            </a:r>
-            <a:r>
-              <a:rPr lang="en-US" altLang="ja-JP" dirty="0" smtClean="0"/>
-              <a:t>length </a:t>
-            </a:r>
-            <a:r>
-              <a:rPr lang="en-US" altLang="ja-JP" dirty="0"/>
-              <a:t>of a </a:t>
-            </a:r>
-            <a:r>
-              <a:rPr lang="en-US" altLang="ja-JP" dirty="0" smtClean="0"/>
-              <a:t>vector (see help(length))</a:t>
-            </a:r>
-            <a:endParaRPr kumimoji="1" lang="ja-JP" altLang="en-US" dirty="0"/>
-          </a:p>
-        </p:txBody>
-      </p:sp>
-    </p:spTree>
-    <p:extLst>
-      <p:ext uri="{BB962C8B-B14F-4D97-AF65-F5344CB8AC3E}">
-        <p14:creationId xmlns:p14="http://schemas.microsoft.com/office/powerpoint/2010/main" val="1788691327"/>
-      </p:ext>
-    </p:extLst>
-  </p:cSld>
-  <p:clrMapOvr>
-    <a:masterClrMapping/>
-  </p:clrMapOvr>
-  <p:timing>
-    <p:tnLst>
-      <p:par>
-        <p:cTn id="1" dur="indefinite" restart="never" nodeType="tmRoot"/>
-      </p:par>
-    </p:tnLst>
-  </p:timing>
-</p:sld>
-</file>
-
-<file path=ppt/slides/slide5.xml><?xml version="1.0" encoding="utf-8"?>
-<p:sld xmlns:a="http://schemas.openxmlformats.org/drawingml/2006/main" xmlns:r="http://schemas.openxmlformats.org/officeDocument/2006/relationships" xmlns:p="http://schemas.openxmlformats.org/presentationml/2006/main">
-  <p:cSld>
-    <p:spTree>
-      <p:nvGrpSpPr>
-        <p:cNvPr id="1" name=""/>
-        <p:cNvGrpSpPr/>
-        <p:nvPr/>
-      </p:nvGrpSpPr>
-      <p:grpSpPr>
-        <a:xfrm>
-          <a:off x="0" y="0"/>
-          <a:ext cx="0" cy="0"/>
-          <a:chOff x="0" y="0"/>
-          <a:chExt cx="0" cy="0"/>
-        </a:xfrm>
-      </p:grpSpPr>
-      <p:sp>
-        <p:nvSpPr>
-          <p:cNvPr id="2" name="タイトル 1"/>
-          <p:cNvSpPr>
-            <a:spLocks noGrp="1"/>
-          </p:cNvSpPr>
-          <p:nvPr>
-            <p:ph type="title"/>
-          </p:nvPr>
-        </p:nvSpPr>
-        <p:spPr/>
-        <p:txBody>
-          <a:bodyPr/>
-          <a:lstStyle/>
-          <a:p>
-            <a:r>
-              <a:rPr kumimoji="1" lang="en-US" altLang="ja-JP" dirty="0" smtClean="0"/>
-              <a:t>Practice 1</a:t>
-            </a:r>
-            <a:endParaRPr kumimoji="1" lang="ja-JP" altLang="en-US" dirty="0"/>
-          </a:p>
-        </p:txBody>
-      </p:sp>
-      <mc:AlternateContent xmlns:mc="http://schemas.openxmlformats.org/markup-compatibility/2006">
-        <mc:Choice xmlns:a14="http://schemas.microsoft.com/office/drawing/2010/main" Requires="a14">
+      <mc:AlternateContent xmlns:mc="http://schemas.openxmlformats.org/markup-compatibility/2006" xmlns:a14="http://schemas.microsoft.com/office/drawing/2010/main">
+        <mc:Choice Requires="a14">
           <p:sp>
             <p:nvSpPr>
               <p:cNvPr id="3" name="コンテンツ プレースホルダー 2"/>
@@ -5554,7 +6017,7 @@
             </p:txBody>
           </p:sp>
         </mc:Choice>
-        <mc:Fallback>
+        <mc:Fallback xmlns="">
           <p:sp>
             <p:nvSpPr>
               <p:cNvPr id="3" name="コンテンツ プレースホルダー 2"/>
@@ -5608,6 +6071,241 @@
 </p:sld>
 </file>
 
+<file path=ppt/slides/slide5.xml><?xml version="1.0" encoding="utf-8"?>
+<p:sld xmlns:a="http://schemas.openxmlformats.org/drawingml/2006/main" xmlns:r="http://schemas.openxmlformats.org/officeDocument/2006/relationships" xmlns:p="http://schemas.openxmlformats.org/presentationml/2006/main">
+  <p:cSld>
+    <p:spTree>
+      <p:nvGrpSpPr>
+        <p:cNvPr id="1" name=""/>
+        <p:cNvGrpSpPr/>
+        <p:nvPr/>
+      </p:nvGrpSpPr>
+      <p:grpSpPr>
+        <a:xfrm>
+          <a:off x="0" y="0"/>
+          <a:ext cx="0" cy="0"/>
+          <a:chOff x="0" y="0"/>
+          <a:chExt cx="0" cy="0"/>
+        </a:xfrm>
+      </p:grpSpPr>
+      <p:sp>
+        <p:nvSpPr>
+          <p:cNvPr id="2" name="タイトル 1"/>
+          <p:cNvSpPr>
+            <a:spLocks noGrp="1"/>
+          </p:cNvSpPr>
+          <p:nvPr>
+            <p:ph type="title"/>
+          </p:nvPr>
+        </p:nvSpPr>
+        <p:spPr/>
+        <p:txBody>
+          <a:bodyPr/>
+          <a:lstStyle/>
+          <a:p>
+            <a:r>
+              <a:rPr kumimoji="1" lang="en-US" altLang="ja-JP" dirty="0" smtClean="0"/>
+              <a:t>Practice 1</a:t>
+            </a:r>
+            <a:endParaRPr kumimoji="1" lang="ja-JP" altLang="en-US" dirty="0"/>
+          </a:p>
+        </p:txBody>
+      </p:sp>
+      <p:sp>
+        <p:nvSpPr>
+          <p:cNvPr id="3" name="コンテンツ プレースホルダー 2"/>
+          <p:cNvSpPr>
+            <a:spLocks noGrp="1"/>
+          </p:cNvSpPr>
+          <p:nvPr>
+            <p:ph idx="1"/>
+          </p:nvPr>
+        </p:nvSpPr>
+        <p:spPr/>
+        <p:txBody>
+          <a:bodyPr/>
+          <a:lstStyle/>
+          <a:p>
+            <a:pPr marL="457200" indent="-457200">
+              <a:buFont typeface="+mj-lt"/>
+              <a:buAutoNum type="arabicPeriod" startAt="6"/>
+            </a:pPr>
+            <a:r>
+              <a:rPr kumimoji="1" lang="en-US" altLang="ja-JP" dirty="0" smtClean="0"/>
+              <a:t>Load data frame from “apple_juice.csv” by</a:t>
+            </a:r>
+          </a:p>
+          <a:p>
+            <a:pPr lvl="2"/>
+            <a:r>
+              <a:rPr lang="en-US" altLang="ja-JP" dirty="0" err="1" smtClean="0"/>
+              <a:t>aj</a:t>
+            </a:r>
+            <a:r>
+              <a:rPr lang="en-US" altLang="ja-JP" dirty="0" smtClean="0"/>
+              <a:t> = read.csv(“apple_juice.csv”) </a:t>
+            </a:r>
+            <a:r>
+              <a:rPr lang="en-US" altLang="ja-JP" dirty="0"/>
+              <a:t># take a look at "Load an Excel(csv) file"</a:t>
+            </a:r>
+            <a:endParaRPr lang="en-US" altLang="ja-JP" dirty="0" smtClean="0"/>
+          </a:p>
+          <a:p>
+            <a:pPr marL="274320" lvl="1" indent="0">
+              <a:buNone/>
+            </a:pPr>
+            <a:r>
+              <a:rPr kumimoji="1" lang="en-US" altLang="ja-JP" dirty="0" smtClean="0"/>
+              <a:t>and run these commands</a:t>
+            </a:r>
+          </a:p>
+          <a:p>
+            <a:pPr marL="731520" lvl="1" indent="-457200">
+              <a:buFont typeface="+mj-lt"/>
+              <a:buAutoNum type="arabicPeriod"/>
+            </a:pPr>
+            <a:r>
+              <a:rPr lang="en-US" altLang="ja-JP" dirty="0" smtClean="0"/>
+              <a:t>summary(</a:t>
+            </a:r>
+            <a:r>
+              <a:rPr lang="en-US" altLang="ja-JP" dirty="0" err="1" smtClean="0"/>
+              <a:t>aj</a:t>
+            </a:r>
+            <a:r>
+              <a:rPr lang="en-US" altLang="ja-JP" dirty="0" smtClean="0"/>
+              <a:t>); summary(</a:t>
+            </a:r>
+            <a:r>
+              <a:rPr lang="en-US" altLang="ja-JP" dirty="0" err="1" smtClean="0"/>
+              <a:t>aj$pH</a:t>
+            </a:r>
+            <a:r>
+              <a:rPr lang="en-US" altLang="ja-JP" dirty="0" smtClean="0"/>
+              <a:t>) # summary function</a:t>
+            </a:r>
+          </a:p>
+          <a:p>
+            <a:pPr marL="731520" lvl="1" indent="-457200">
+              <a:buFont typeface="+mj-lt"/>
+              <a:buAutoNum type="arabicPeriod"/>
+            </a:pPr>
+            <a:r>
+              <a:rPr kumimoji="1" lang="en-US" altLang="ja-JP" dirty="0" smtClean="0"/>
+              <a:t>mean(</a:t>
+            </a:r>
+            <a:r>
+              <a:rPr kumimoji="1" lang="en-US" altLang="ja-JP" dirty="0" err="1" smtClean="0"/>
+              <a:t>aj$pH</a:t>
+            </a:r>
+            <a:r>
+              <a:rPr kumimoji="1" lang="en-US" altLang="ja-JP" dirty="0" smtClean="0"/>
+              <a:t>)</a:t>
+            </a:r>
+          </a:p>
+          <a:p>
+            <a:pPr marL="731520" lvl="1" indent="-457200">
+              <a:buFont typeface="+mj-lt"/>
+              <a:buAutoNum type="arabicPeriod"/>
+            </a:pPr>
+            <a:r>
+              <a:rPr lang="en-US" altLang="ja-JP" dirty="0" smtClean="0"/>
+              <a:t>median(</a:t>
+            </a:r>
+            <a:r>
+              <a:rPr lang="en-US" altLang="ja-JP" dirty="0" err="1" smtClean="0"/>
+              <a:t>aj$pH</a:t>
+            </a:r>
+            <a:r>
+              <a:rPr lang="en-US" altLang="ja-JP" dirty="0" smtClean="0"/>
+              <a:t>)</a:t>
+            </a:r>
+          </a:p>
+          <a:p>
+            <a:pPr marL="731520" lvl="1" indent="-457200">
+              <a:buFont typeface="+mj-lt"/>
+              <a:buAutoNum type="arabicPeriod"/>
+            </a:pPr>
+            <a:r>
+              <a:rPr lang="en-US" altLang="ja-JP" dirty="0" smtClean="0"/>
+              <a:t>range(</a:t>
+            </a:r>
+            <a:r>
+              <a:rPr lang="en-US" altLang="ja-JP" dirty="0" err="1" smtClean="0"/>
+              <a:t>aj$pH</a:t>
+            </a:r>
+            <a:r>
+              <a:rPr lang="en-US" altLang="ja-JP" dirty="0" smtClean="0"/>
+              <a:t>)</a:t>
+            </a:r>
+          </a:p>
+          <a:p>
+            <a:pPr marL="731520" lvl="1" indent="-457200">
+              <a:buFont typeface="+mj-lt"/>
+              <a:buAutoNum type="arabicPeriod"/>
+            </a:pPr>
+            <a:r>
+              <a:rPr lang="en-US" altLang="ja-JP" dirty="0" err="1" smtClean="0"/>
+              <a:t>var</a:t>
+            </a:r>
+            <a:r>
+              <a:rPr lang="en-US" altLang="ja-JP" dirty="0" smtClean="0"/>
+              <a:t>(</a:t>
+            </a:r>
+            <a:r>
+              <a:rPr lang="en-US" altLang="ja-JP" dirty="0" err="1" smtClean="0"/>
+              <a:t>aj$pH</a:t>
+            </a:r>
+            <a:r>
+              <a:rPr lang="en-US" altLang="ja-JP" dirty="0" smtClean="0"/>
+              <a:t>)</a:t>
+            </a:r>
+          </a:p>
+          <a:p>
+            <a:pPr marL="731520" lvl="1" indent="-457200">
+              <a:buFont typeface="+mj-lt"/>
+              <a:buAutoNum type="arabicPeriod"/>
+            </a:pPr>
+            <a:r>
+              <a:rPr lang="en-US" altLang="ja-JP" dirty="0" err="1" smtClean="0"/>
+              <a:t>sd</a:t>
+            </a:r>
+            <a:r>
+              <a:rPr lang="en-US" altLang="ja-JP" dirty="0" smtClean="0"/>
+              <a:t>(</a:t>
+            </a:r>
+            <a:r>
+              <a:rPr lang="en-US" altLang="ja-JP" dirty="0" err="1" smtClean="0"/>
+              <a:t>aj$pH</a:t>
+            </a:r>
+            <a:r>
+              <a:rPr lang="en-US" altLang="ja-JP" dirty="0" smtClean="0"/>
+              <a:t>)</a:t>
+            </a:r>
+          </a:p>
+        </p:txBody>
+      </p:sp>
+    </p:spTree>
+    <p:extLst>
+      <p:ext uri="{BB962C8B-B14F-4D97-AF65-F5344CB8AC3E}">
+        <p14:creationId xmlns:p14="http://schemas.microsoft.com/office/powerpoint/2010/main" val="2795786129"/>
+      </p:ext>
+    </p:extLst>
+  </p:cSld>
+  <p:clrMapOvr>
+    <a:masterClrMapping/>
+  </p:clrMapOvr>
+  <p:timing>
+    <p:tnLst>
+      <p:par>
+        <p:cTn id="1" dur="indefinite" restart="never" nodeType="tmRoot"/>
+      </p:par>
+    </p:tnLst>
+  </p:timing>
+</p:sld>
+</file>
+
 <file path=ppt/slides/slide6.xml><?xml version="1.0" encoding="utf-8"?>
 <p:sld xmlns:a="http://schemas.openxmlformats.org/drawingml/2006/main" xmlns:r="http://schemas.openxmlformats.org/officeDocument/2006/relationships" xmlns:p="http://schemas.openxmlformats.org/presentationml/2006/main">
   <p:cSld>
@@ -5642,7 +6340,7 @@
           <a:p>
             <a:r>
               <a:rPr kumimoji="1" lang="en-US" altLang="ja-JP" dirty="0" smtClean="0"/>
-              <a:t>Practice 1</a:t>
+              <a:t>Graph</a:t>
             </a:r>
             <a:endParaRPr kumimoji="1" lang="ja-JP" altLang="en-US" dirty="0"/>
           </a:p>
@@ -5650,183 +6348,27 @@
       </p:sp>
       <p:sp>
         <p:nvSpPr>
-          <p:cNvPr id="3" name="コンテンツ プレースホルダー 2"/>
-          <p:cNvSpPr>
-            <a:spLocks noGrp="1"/>
-          </p:cNvSpPr>
-          <p:nvPr>
-            <p:ph idx="1"/>
-          </p:nvPr>
-        </p:nvSpPr>
-        <p:spPr/>
-        <p:txBody>
-          <a:bodyPr/>
-          <a:lstStyle/>
-          <a:p>
-            <a:pPr marL="457200" indent="-457200">
-              <a:buFont typeface="+mj-lt"/>
-              <a:buAutoNum type="arabicPeriod" startAt="6"/>
-            </a:pPr>
-            <a:r>
-              <a:rPr kumimoji="1" lang="en-US" altLang="ja-JP" dirty="0" smtClean="0"/>
-              <a:t>Load data frame from “apple_juice.csv” by</a:t>
-            </a:r>
-          </a:p>
-          <a:p>
-            <a:pPr lvl="2"/>
-            <a:r>
-              <a:rPr lang="en-US" altLang="ja-JP" dirty="0" err="1" smtClean="0"/>
-              <a:t>aj</a:t>
-            </a:r>
-            <a:r>
-              <a:rPr lang="en-US" altLang="ja-JP" dirty="0" smtClean="0"/>
-              <a:t> = read.csv(“apple_juice.csv”) </a:t>
-            </a:r>
-            <a:r>
-              <a:rPr lang="en-US" altLang="ja-JP" dirty="0"/>
-              <a:t># take a look at "Load an Excel(csv) file"</a:t>
-            </a:r>
-            <a:endParaRPr lang="en-US" altLang="ja-JP" dirty="0" smtClean="0"/>
-          </a:p>
-          <a:p>
-            <a:pPr marL="274320" lvl="1" indent="0">
-              <a:buNone/>
-            </a:pPr>
-            <a:r>
-              <a:rPr kumimoji="1" lang="en-US" altLang="ja-JP" dirty="0" smtClean="0"/>
-              <a:t>and run these commands</a:t>
-            </a:r>
-          </a:p>
-          <a:p>
-            <a:pPr marL="731520" lvl="1" indent="-457200">
-              <a:buFont typeface="+mj-lt"/>
-              <a:buAutoNum type="arabicPeriod"/>
-            </a:pPr>
-            <a:r>
-              <a:rPr lang="en-US" altLang="ja-JP" dirty="0" smtClean="0"/>
-              <a:t>summary(</a:t>
-            </a:r>
-            <a:r>
-              <a:rPr lang="en-US" altLang="ja-JP" dirty="0" err="1" smtClean="0"/>
-              <a:t>aj</a:t>
-            </a:r>
-            <a:r>
-              <a:rPr lang="en-US" altLang="ja-JP" dirty="0" smtClean="0"/>
-              <a:t>); summary(</a:t>
-            </a:r>
-            <a:r>
-              <a:rPr lang="en-US" altLang="ja-JP" dirty="0" err="1" smtClean="0"/>
-              <a:t>aj$pH</a:t>
-            </a:r>
-            <a:r>
-              <a:rPr lang="en-US" altLang="ja-JP" dirty="0" smtClean="0"/>
-              <a:t>) # summary function</a:t>
-            </a:r>
-          </a:p>
-          <a:p>
-            <a:pPr marL="731520" lvl="1" indent="-457200">
-              <a:buFont typeface="+mj-lt"/>
-              <a:buAutoNum type="arabicPeriod"/>
-            </a:pPr>
-            <a:r>
-              <a:rPr kumimoji="1" lang="en-US" altLang="ja-JP" dirty="0" smtClean="0"/>
-              <a:t>mean(</a:t>
-            </a:r>
-            <a:r>
-              <a:rPr kumimoji="1" lang="en-US" altLang="ja-JP" dirty="0" err="1" smtClean="0"/>
-              <a:t>aj$pH</a:t>
-            </a:r>
-            <a:r>
-              <a:rPr kumimoji="1" lang="en-US" altLang="ja-JP" dirty="0" smtClean="0"/>
-              <a:t>)</a:t>
-            </a:r>
-          </a:p>
-          <a:p>
-            <a:pPr marL="731520" lvl="1" indent="-457200">
-              <a:buFont typeface="+mj-lt"/>
-              <a:buAutoNum type="arabicPeriod"/>
-            </a:pPr>
-            <a:r>
-              <a:rPr lang="en-US" altLang="ja-JP" dirty="0" smtClean="0"/>
-              <a:t>median(</a:t>
-            </a:r>
-            <a:r>
-              <a:rPr lang="en-US" altLang="ja-JP" dirty="0" err="1" smtClean="0"/>
-              <a:t>aj$pH</a:t>
-            </a:r>
-            <a:r>
-              <a:rPr lang="en-US" altLang="ja-JP" dirty="0" smtClean="0"/>
-              <a:t>)</a:t>
-            </a:r>
-          </a:p>
-          <a:p>
-            <a:pPr marL="731520" lvl="1" indent="-457200">
-              <a:buFont typeface="+mj-lt"/>
-              <a:buAutoNum type="arabicPeriod"/>
-            </a:pPr>
-            <a:r>
-              <a:rPr lang="en-US" altLang="ja-JP" dirty="0" smtClean="0"/>
-              <a:t>range(</a:t>
-            </a:r>
-            <a:r>
-              <a:rPr lang="en-US" altLang="ja-JP" dirty="0" err="1" smtClean="0"/>
-              <a:t>aj$pH</a:t>
-            </a:r>
-            <a:r>
-              <a:rPr lang="en-US" altLang="ja-JP" dirty="0" smtClean="0"/>
-              <a:t>)</a:t>
-            </a:r>
-          </a:p>
-          <a:p>
-            <a:pPr marL="731520" lvl="1" indent="-457200">
-              <a:buFont typeface="+mj-lt"/>
-              <a:buAutoNum type="arabicPeriod"/>
-            </a:pPr>
-            <a:r>
-              <a:rPr lang="en-US" altLang="ja-JP" dirty="0" err="1" smtClean="0"/>
-              <a:t>var</a:t>
-            </a:r>
-            <a:r>
-              <a:rPr lang="en-US" altLang="ja-JP" dirty="0" smtClean="0"/>
-              <a:t>(</a:t>
-            </a:r>
-            <a:r>
-              <a:rPr lang="en-US" altLang="ja-JP" dirty="0" err="1" smtClean="0"/>
-              <a:t>aj$pH</a:t>
-            </a:r>
-            <a:r>
-              <a:rPr lang="en-US" altLang="ja-JP" dirty="0" smtClean="0"/>
-              <a:t>)</a:t>
-            </a:r>
-          </a:p>
-          <a:p>
-            <a:pPr marL="731520" lvl="1" indent="-457200">
-              <a:buFont typeface="+mj-lt"/>
-              <a:buAutoNum type="arabicPeriod"/>
-            </a:pPr>
-            <a:r>
-              <a:rPr lang="en-US" altLang="ja-JP" dirty="0" err="1" smtClean="0"/>
-              <a:t>sd</a:t>
-            </a:r>
-            <a:r>
-              <a:rPr lang="en-US" altLang="ja-JP" dirty="0" smtClean="0"/>
-              <a:t>(</a:t>
-            </a:r>
-            <a:r>
-              <a:rPr lang="en-US" altLang="ja-JP" dirty="0" err="1" smtClean="0"/>
-              <a:t>aj$pH</a:t>
-            </a:r>
-            <a:r>
-              <a:rPr lang="en-US" altLang="ja-JP" dirty="0" smtClean="0"/>
-              <a:t>)</a:t>
-            </a:r>
+          <p:cNvPr id="3" name="テキスト プレースホルダー 2"/>
+          <p:cNvSpPr>
+            <a:spLocks noGrp="1"/>
+          </p:cNvSpPr>
+          <p:nvPr>
+            <p:ph type="body" idx="1"/>
+          </p:nvPr>
+        </p:nvSpPr>
+        <p:spPr/>
+        <p:txBody>
+          <a:bodyPr/>
+          <a:lstStyle/>
+          <a:p>
+            <a:endParaRPr kumimoji="1" lang="ja-JP" altLang="en-US"/>
           </a:p>
         </p:txBody>
       </p:sp>
     </p:spTree>
     <p:extLst>
       <p:ext uri="{BB962C8B-B14F-4D97-AF65-F5344CB8AC3E}">
-        <p14:creationId xmlns:p14="http://schemas.microsoft.com/office/powerpoint/2010/main" val="2795786129"/>
+        <p14:creationId xmlns:p14="http://schemas.microsoft.com/office/powerpoint/2010/main" val="221458975"/>
       </p:ext>
     </p:extLst>
   </p:cSld>
@@ -5862,7 +6404,7 @@
       </p:grpSpPr>
       <p:sp>
         <p:nvSpPr>
-          <p:cNvPr id="2" name="タイトル 1"/>
+          <p:cNvPr id="4" name="タイトル 3"/>
           <p:cNvSpPr>
             <a:spLocks noGrp="1"/>
           </p:cNvSpPr>
@@ -5877,7 +6419,7 @@
           <a:p>
             <a:r>
               <a:rPr kumimoji="1" lang="en-US" altLang="ja-JP" dirty="0" smtClean="0"/>
-              <a:t>Graph</a:t>
+              <a:t>Practice 2</a:t>
             </a:r>
             <a:endParaRPr kumimoji="1" lang="ja-JP" altLang="en-US" dirty="0"/>
           </a:p>
@@ -5885,27 +6427,175 @@
       </p:sp>
       <p:sp>
         <p:nvSpPr>
-          <p:cNvPr id="3" name="テキスト プレースホルダー 2"/>
-          <p:cNvSpPr>
-            <a:spLocks noGrp="1"/>
-          </p:cNvSpPr>
-          <p:nvPr>
-            <p:ph type="body" idx="1"/>
-          </p:nvPr>
-        </p:nvSpPr>
-        <p:spPr/>
-        <p:txBody>
-          <a:bodyPr/>
-          <a:lstStyle/>
-          <a:p>
-            <a:endParaRPr kumimoji="1" lang="ja-JP" altLang="en-US"/>
+          <p:cNvPr id="5" name="コンテンツ プレースホルダー 4"/>
+          <p:cNvSpPr>
+            <a:spLocks noGrp="1"/>
+          </p:cNvSpPr>
+          <p:nvPr>
+            <p:ph idx="1"/>
+          </p:nvPr>
+        </p:nvSpPr>
+        <p:spPr/>
+        <p:txBody>
+          <a:bodyPr/>
+          <a:lstStyle/>
+          <a:p>
+            <a:pPr marL="457200" indent="-457200">
+              <a:buFont typeface="+mj-lt"/>
+              <a:buAutoNum type="arabicPeriod"/>
+            </a:pPr>
+            <a:r>
+              <a:rPr kumimoji="1" lang="en-US" altLang="ja-JP" dirty="0" smtClean="0"/>
+              <a:t>Draw these graphs:</a:t>
+            </a:r>
+          </a:p>
+          <a:p>
+            <a:pPr marL="731520" lvl="1" indent="-457200">
+              <a:buFont typeface="+mj-lt"/>
+              <a:buAutoNum type="arabicPeriod"/>
+            </a:pPr>
+            <a:r>
+              <a:rPr lang="en-US" altLang="ja-JP" dirty="0" smtClean="0"/>
+              <a:t>y = x</a:t>
+            </a:r>
+          </a:p>
+          <a:p>
+            <a:pPr marL="731520" lvl="1" indent="-457200">
+              <a:buFont typeface="+mj-lt"/>
+              <a:buAutoNum type="arabicPeriod"/>
+            </a:pPr>
+            <a:r>
+              <a:rPr kumimoji="1" lang="en-US" altLang="ja-JP" dirty="0" smtClean="0"/>
+              <a:t>y = cos(x)</a:t>
+            </a:r>
+          </a:p>
+          <a:p>
+            <a:pPr marL="731520" lvl="1" indent="-457200">
+              <a:buFont typeface="+mj-lt"/>
+              <a:buAutoNum type="arabicPeriod"/>
+            </a:pPr>
+            <a:r>
+              <a:rPr lang="en-US" altLang="ja-JP" dirty="0" smtClean="0"/>
+              <a:t>y = </a:t>
+            </a:r>
+            <a:r>
+              <a:rPr lang="en-US" altLang="ja-JP" dirty="0" err="1" smtClean="0"/>
+              <a:t>asin</a:t>
+            </a:r>
+            <a:r>
+              <a:rPr lang="en-US" altLang="ja-JP" dirty="0" smtClean="0"/>
+              <a:t>(x)</a:t>
+            </a:r>
+          </a:p>
+          <a:p>
+            <a:pPr marL="731520" lvl="1" indent="-457200">
+              <a:buFont typeface="+mj-lt"/>
+              <a:buAutoNum type="arabicPeriod"/>
+            </a:pPr>
+            <a:r>
+              <a:rPr lang="en-US" altLang="ja-JP" dirty="0" smtClean="0"/>
+              <a:t>y = </a:t>
+            </a:r>
+            <a:r>
+              <a:rPr lang="en-US" altLang="ja-JP" dirty="0" err="1" smtClean="0"/>
+              <a:t>atan</a:t>
+            </a:r>
+            <a:r>
+              <a:rPr lang="en-US" altLang="ja-JP" dirty="0" smtClean="0"/>
+              <a:t>(x)</a:t>
+            </a:r>
+          </a:p>
+          <a:p>
+            <a:pPr marL="731520" lvl="1" indent="-457200">
+              <a:buFont typeface="+mj-lt"/>
+              <a:buAutoNum type="arabicPeriod"/>
+            </a:pPr>
+            <a:r>
+              <a:rPr kumimoji="1" lang="en-US" altLang="ja-JP" dirty="0" smtClean="0"/>
+              <a:t>y = log(x)</a:t>
+            </a:r>
+          </a:p>
+          <a:p>
+            <a:pPr marL="731520" lvl="1" indent="-457200">
+              <a:buFont typeface="+mj-lt"/>
+              <a:buAutoNum type="arabicPeriod"/>
+            </a:pPr>
+            <a:r>
+              <a:rPr lang="en-US" altLang="ja-JP" dirty="0" smtClean="0"/>
+              <a:t>y = </a:t>
+            </a:r>
+            <a:r>
+              <a:rPr lang="en-US" altLang="ja-JP" dirty="0" err="1" smtClean="0"/>
+              <a:t>exp</a:t>
+            </a:r>
+            <a:r>
+              <a:rPr lang="en-US" altLang="ja-JP" dirty="0" smtClean="0"/>
+              <a:t>(x)</a:t>
+            </a:r>
+          </a:p>
+          <a:p>
+            <a:pPr marL="731520" lvl="1" indent="-457200">
+              <a:buFont typeface="+mj-lt"/>
+              <a:buAutoNum type="arabicPeriod"/>
+            </a:pPr>
+            <a:r>
+              <a:rPr kumimoji="1" lang="en-US" altLang="ja-JP" dirty="0" smtClean="0"/>
+              <a:t>y = floor(x)</a:t>
+            </a:r>
+          </a:p>
+          <a:p>
+            <a:pPr marL="731520" lvl="1" indent="-457200">
+              <a:buFont typeface="+mj-lt"/>
+              <a:buAutoNum type="arabicPeriod"/>
+            </a:pPr>
+            <a:r>
+              <a:rPr lang="en-US" altLang="ja-JP" dirty="0" smtClean="0"/>
+              <a:t>y = </a:t>
+            </a:r>
+            <a:r>
+              <a:rPr lang="en-US" altLang="ja-JP" dirty="0" err="1" smtClean="0"/>
+              <a:t>trunc</a:t>
+            </a:r>
+            <a:r>
+              <a:rPr lang="en-US" altLang="ja-JP" dirty="0" smtClean="0"/>
+              <a:t>(x / 60)</a:t>
+            </a:r>
+          </a:p>
+          <a:p>
+            <a:pPr marL="731520" lvl="1" indent="-457200">
+              <a:buFont typeface="+mj-lt"/>
+              <a:buAutoNum type="arabicPeriod"/>
+            </a:pPr>
+            <a:r>
+              <a:rPr kumimoji="1" lang="en-US" altLang="ja-JP" dirty="0" smtClean="0"/>
+              <a:t>y = </a:t>
+            </a:r>
+            <a:r>
+              <a:rPr kumimoji="1" lang="en-US" altLang="ja-JP" dirty="0" err="1" smtClean="0"/>
+              <a:t>trunc</a:t>
+            </a:r>
+            <a:r>
+              <a:rPr kumimoji="1" lang="en-US" altLang="ja-JP" dirty="0" smtClean="0"/>
+              <a:t>(x %% 60)</a:t>
+            </a:r>
+          </a:p>
+          <a:p>
+            <a:pPr marL="731520" lvl="1" indent="-457200">
+              <a:buFont typeface="+mj-lt"/>
+              <a:buAutoNum type="arabicPeriod"/>
+            </a:pPr>
+            <a:r>
+              <a:rPr lang="en-US" altLang="ja-JP" dirty="0" smtClean="0"/>
+              <a:t>y = floor(log10(x)) + 1</a:t>
+            </a:r>
+            <a:endParaRPr kumimoji="1" lang="ja-JP" altLang="en-US" dirty="0"/>
           </a:p>
         </p:txBody>
       </p:sp>
     </p:spTree>
     <p:extLst>
       <p:ext uri="{BB962C8B-B14F-4D97-AF65-F5344CB8AC3E}">
-        <p14:creationId xmlns:p14="http://schemas.microsoft.com/office/powerpoint/2010/main" val="221458975"/>
+        <p14:creationId xmlns:p14="http://schemas.microsoft.com/office/powerpoint/2010/main" val="2171836513"/>
       </p:ext>
     </p:extLst>
   </p:cSld>
@@ -5941,7 +6631,7 @@
       </p:grpSpPr>
       <p:sp>
         <p:nvSpPr>
-          <p:cNvPr id="4" name="タイトル 3"/>
+          <p:cNvPr id="2" name="タイトル 1"/>
           <p:cNvSpPr>
             <a:spLocks noGrp="1"/>
           </p:cNvSpPr>
@@ -5964,7 +6654,7 @@
       </p:sp>
       <p:sp>
         <p:nvSpPr>
-          <p:cNvPr id="5" name="コンテンツ プレースホルダー 4"/>
+          <p:cNvPr id="3" name="コンテンツ プレースホルダー 2"/>
           <p:cNvSpPr>
             <a:spLocks noGrp="1"/>
           </p:cNvSpPr>
@@ -5979,11 +6669,11 @@
           <a:p>
             <a:pPr marL="457200" indent="-457200">
               <a:buFont typeface="+mj-lt"/>
-              <a:buAutoNum type="arabicPeriod"/>
+              <a:buAutoNum type="arabicPeriod" startAt="2"/>
             </a:pPr>
             <a:r>
               <a:rPr kumimoji="1" lang="en-US" altLang="ja-JP" dirty="0" smtClean="0"/>
-              <a:t>Draw these graphs:</a:t>
+              <a:t>To draw multiple graphs, run</a:t>
             </a:r>
           </a:p>
           <a:p>
@@ -5992,8 +6682,22 @@
               <a:buAutoNum type="arabicPeriod"/>
             </a:pPr>
             <a:r>
-              <a:rPr lang="en-US" altLang="ja-JP" dirty="0" smtClean="0"/>
-              <a:t>y = x</a:t>
+              <a:rPr kumimoji="1" lang="en-US" altLang="ja-JP" dirty="0" smtClean="0"/>
+              <a:t>same axis:</a:t>
+            </a:r>
+          </a:p>
+          <a:p>
+            <a:pPr lvl="2"/>
+            <a:r>
+              <a:rPr lang="en-US" altLang="ja-JP" dirty="0" smtClean="0"/>
+              <a:t>plot(x, y1, type=‘l’)</a:t>
+            </a:r>
+          </a:p>
+          <a:p>
+            <a:pPr lvl="2"/>
+            <a:r>
+              <a:rPr kumimoji="1" lang="en-US" altLang="ja-JP" dirty="0" smtClean="0"/>
+              <a:t>lines(x, y2, type=‘l’) # just draw line over the graph</a:t>
             </a:r>
           </a:p>
           <a:p>
@@ -6002,128 +6706,75 @@
               <a:buAutoNum type="arabicPeriod"/>
             </a:pPr>
             <a:r>
+              <a:rPr lang="en-US" altLang="ja-JP" dirty="0" smtClean="0"/>
+              <a:t>multiple axis:</a:t>
+            </a:r>
+          </a:p>
+          <a:p>
+            <a:pPr lvl="2"/>
+            <a:r>
               <a:rPr kumimoji="1" lang="en-US" altLang="ja-JP" dirty="0" smtClean="0"/>
-              <a:t>y = cos(x)</a:t>
-            </a:r>
-          </a:p>
-          <a:p>
-            <a:pPr marL="731520" lvl="1" indent="-457200">
-              <a:buFont typeface="+mj-lt"/>
-              <a:buAutoNum type="arabicPeriod"/>
-            </a:pPr>
-            <a:r>
-              <a:rPr lang="en-US" altLang="ja-JP" dirty="0" smtClean="0"/>
-              <a:t>y = </a:t>
+              <a:t>par(</a:t>
+            </a:r>
+            <a:r>
+              <a:rPr kumimoji="1" lang="en-US" altLang="ja-JP" dirty="0" err="1" smtClean="0"/>
+              <a:t>mfrow</a:t>
+            </a:r>
+            <a:r>
+              <a:rPr kumimoji="1" lang="en-US" altLang="ja-JP" dirty="0" smtClean="0"/>
+              <a:t>=c(1,2))  # create two graphs on a window</a:t>
+            </a:r>
+          </a:p>
+          <a:p>
+            <a:pPr lvl="2"/>
+            <a:r>
+              <a:rPr lang="en-US" altLang="ja-JP" dirty="0" smtClean="0"/>
+              <a:t>plot(x, y1, type=‘l’) # draw first graph</a:t>
+            </a:r>
+          </a:p>
+          <a:p>
+            <a:pPr lvl="2"/>
+            <a:r>
+              <a:rPr kumimoji="1" lang="en-US" altLang="ja-JP" dirty="0" smtClean="0"/>
+              <a:t>plot(x, y2, type=‘l’) # draw second graph</a:t>
+            </a:r>
+          </a:p>
+          <a:p>
+            <a:pPr lvl="2"/>
+            <a:r>
+              <a:rPr lang="en-US" altLang="ja-JP" dirty="0" smtClean="0"/>
+              <a:t>par(</a:t>
             </a:r>
             <a:r>
               <a:rPr lang="en-US" altLang="ja-JP" dirty="0" err="1" smtClean="0"/>
-              <a:t>asin</a:t>
-            </a:r>
-            <a:r>
-              <a:rPr lang="en-US" altLang="ja-JP" dirty="0" smtClean="0"/>
-              <a:t>(x)</a:t>
-            </a:r>
-          </a:p>
-          <a:p>
-            <a:pPr marL="731520" lvl="1" indent="-457200">
-              <a:buFont typeface="+mj-lt"/>
-              <a:buAutoNum type="arabicPeriod"/>
-            </a:pPr>
-            <a:r>
-              <a:rPr lang="en-US" altLang="ja-JP" dirty="0" smtClean="0"/>
-              <a:t>y = </a:t>
-            </a:r>
-            <a:r>
-              <a:rPr lang="en-US" altLang="ja-JP" dirty="0" err="1" smtClean="0"/>
-              <a:t>atan</a:t>
-            </a:r>
-            <a:r>
-              <a:rPr lang="en-US" altLang="ja-JP" dirty="0" smtClean="0"/>
-              <a:t>(x)</a:t>
-            </a:r>
-          </a:p>
-          <a:p>
-            <a:pPr marL="731520" lvl="1" indent="-457200">
-              <a:buFont typeface="+mj-lt"/>
-              <a:buAutoNum type="arabicPeriod"/>
-            </a:pPr>
+              <a:t>mfrow</a:t>
+            </a:r>
+            <a:r>
+              <a:rPr lang="en-US" altLang="ja-JP" dirty="0" smtClean="0"/>
+              <a:t>=c(1,1)) # reset layout(single graph)</a:t>
+            </a:r>
+          </a:p>
+          <a:p>
+            <a:pPr lvl="1"/>
             <a:r>
               <a:rPr kumimoji="1" lang="en-US" altLang="ja-JP" dirty="0" smtClean="0"/>
-              <a:t>y = log(x)</a:t>
-            </a:r>
-          </a:p>
-          <a:p>
-            <a:pPr marL="731520" lvl="1" indent="-457200">
-              <a:buFont typeface="+mj-lt"/>
-              <a:buAutoNum type="arabicPeriod"/>
-            </a:pPr>
-            <a:r>
-              <a:rPr lang="en-US" altLang="ja-JP" dirty="0" smtClean="0"/>
-              <a:t>y = </a:t>
-            </a:r>
-            <a:r>
-              <a:rPr lang="en-US" altLang="ja-JP" dirty="0" err="1" smtClean="0"/>
+              <a:t>Try 1. and 2. for x=</a:t>
+            </a:r>
+            <a:r>
+              <a:rPr kumimoji="1" lang="en-US" altLang="ja-JP" dirty="0" err="1" smtClean="0"/>
+              <a:t>seq</a:t>
+            </a:r>
+            <a:r>
+              <a:rPr kumimoji="1" lang="en-US" altLang="ja-JP" dirty="0" smtClean="0"/>
+              <a:t>(0,1,len=1000), y1=x^2, y2=</a:t>
+            </a:r>
+            <a:r>
+              <a:rPr kumimoji="1" lang="en-US" altLang="ja-JP" dirty="0" err="1" smtClean="0"/>
               <a:t>exp</a:t>
             </a:r>
             <a:r>
-              <a:rPr lang="en-US" altLang="ja-JP" dirty="0" smtClean="0"/>
-              <a:t>(x)</a:t>
-            </a:r>
-          </a:p>
-          <a:p>
-            <a:pPr marL="731520" lvl="1" indent="-457200">
-              <a:buFont typeface="+mj-lt"/>
-              <a:buAutoNum type="arabicPeriod"/>
-            </a:pPr>
-            <a:r>
               <a:rPr kumimoji="1" lang="en-US" altLang="ja-JP" dirty="0" smtClean="0"/>
-              <a:t>y = floor(x)</a:t>
-            </a:r>
-          </a:p>
-          <a:p>
-            <a:pPr marL="731520" lvl="1" indent="-457200">
-              <a:buFont typeface="+mj-lt"/>
-              <a:buAutoNum type="arabicPeriod"/>
-            </a:pPr>
-            <a:r>
-              <a:rPr lang="en-US" altLang="ja-JP" dirty="0" smtClean="0"/>
-              <a:t>y = </a:t>
-            </a:r>
-            <a:r>
-              <a:rPr lang="en-US" altLang="ja-JP" dirty="0" err="1" smtClean="0"/>
-              <a:t>trunc</a:t>
-            </a:r>
-            <a:r>
-              <a:rPr lang="en-US" altLang="ja-JP" dirty="0" smtClean="0"/>
-              <a:t>(x / 60)</a:t>
-            </a:r>
-          </a:p>
-          <a:p>
-            <a:pPr marL="731520" lvl="1" indent="-457200">
-              <a:buFont typeface="+mj-lt"/>
-              <a:buAutoNum type="arabicPeriod"/>
-            </a:pPr>
-            <a:r>
-              <a:rPr kumimoji="1" lang="en-US" altLang="ja-JP" dirty="0" smtClean="0"/>
-              <a:t>y = </a:t>
-            </a:r>
-            <a:r>
-              <a:rPr kumimoji="1" lang="en-US" altLang="ja-JP" dirty="0" err="1" smtClean="0"/>
-              <a:t>trunc</a:t>
-            </a:r>
-            <a:r>
-              <a:rPr kumimoji="1" lang="en-US" altLang="ja-JP" dirty="0" smtClean="0"/>
-              <a:t>(x %% 60)</a:t>
-            </a:r>
-          </a:p>
-          <a:p>
-            <a:pPr marL="731520" lvl="1" indent="-457200">
-              <a:buFont typeface="+mj-lt"/>
-              <a:buAutoNum type="arabicPeriod"/>
-            </a:pPr>
-            <a:r>
-              <a:rPr lang="en-US" altLang="ja-JP" dirty="0" smtClean="0"/>
-              <a:t>y = floor(log10(x)) + 1</a:t>
+              <a:t>(x)-1</a:t>
             </a:r>
             <a:endParaRPr kumimoji="1" lang="ja-JP" altLang="en-US" dirty="0"/>
           </a:p>
@@ -6132,7 +6783,7 @@
     </p:spTree>
     <p:extLst>
       <p:ext uri="{BB962C8B-B14F-4D97-AF65-F5344CB8AC3E}">
-        <p14:creationId xmlns:p14="http://schemas.microsoft.com/office/powerpoint/2010/main" val="2171836513"/>
+        <p14:creationId xmlns:p14="http://schemas.microsoft.com/office/powerpoint/2010/main" val="2121717482"/>
       </p:ext>
     </p:extLst>
   </p:cSld>
@@ -6196,131 +6847,94 @@
             <a:spLocks noGrp="1"/>
           </p:cNvSpPr>
           <p:nvPr>
-            <p:ph idx="1"/>
-          </p:nvPr>
-        </p:nvSpPr>
-        <p:spPr/>
-        <p:txBody>
-          <a:bodyPr/>
-          <a:lstStyle/>
-          <a:p>
-            <a:pPr marL="457200" indent="-457200">
+            <p:ph sz="half" idx="1"/>
+          </p:nvPr>
+        </p:nvSpPr>
+        <p:spPr/>
+        <p:txBody>
+          <a:bodyPr/>
+          <a:lstStyle/>
+          <a:p>
+            <a:pPr marL="514350" indent="-514350">
               <a:buFont typeface="+mj-lt"/>
-              <a:buAutoNum type="arabicPeriod" startAt="2"/>
+              <a:buAutoNum type="arabicPeriod" startAt="3"/>
             </a:pPr>
             <a:r>
               <a:rPr kumimoji="1" lang="en-US" altLang="ja-JP" dirty="0" smtClean="0"/>
-              <a:t>To draw multiple graphs, run</a:t>
-            </a:r>
-          </a:p>
-          <a:p>
-            <a:pPr marL="731520" lvl="1" indent="-457200">
-              <a:buFont typeface="+mj-lt"/>
-              <a:buAutoNum type="arabicPeriod"/>
-            </a:pPr>
-            <a:r>
-              <a:rPr kumimoji="1" lang="en-US" altLang="ja-JP" dirty="0" smtClean="0"/>
-              <a:t>same axis:</a:t>
-            </a:r>
-          </a:p>
-          <a:p>
-            <a:pPr lvl="2"/>
-            <a:r>
-              <a:rPr lang="en-US" altLang="ja-JP" dirty="0" smtClean="0"/>
-              <a:t>plot(x, y1, type=‘l’)</a:t>
-            </a:r>
-          </a:p>
-          <a:p>
-            <a:pPr lvl="2"/>
-            <a:r>
-              <a:rPr kumimoji="1" lang="en-US" altLang="ja-JP" dirty="0" smtClean="0"/>
-              <a:t>lines(x, y2, type=‘l’) # just draw line over the graph</a:t>
-            </a:r>
-          </a:p>
-          <a:p>
-            <a:pPr marL="731520" lvl="1" indent="-457200">
-              <a:buFont typeface="+mj-lt"/>
-              <a:buAutoNum type="arabicPeriod"/>
-            </a:pPr>
-            <a:r>
-              <a:rPr lang="en-US" altLang="ja-JP" dirty="0" smtClean="0"/>
-              <a:t>multiple axis:</a:t>
-            </a:r>
-          </a:p>
-          <a:p>
-            <a:pPr lvl="2"/>
-            <a:r>
-              <a:rPr kumimoji="1" lang="en-US" altLang="ja-JP" dirty="0" smtClean="0"/>
-              <a:t>par(</a:t>
-            </a:r>
-            <a:r>
-              <a:rPr kumimoji="1" lang="en-US" altLang="ja-JP" dirty="0" err="1" smtClean="0"/>
-              <a:t>mfrow</a:t>
-            </a:r>
-            <a:r>
-              <a:rPr kumimoji="1" lang="en-US" altLang="ja-JP" dirty="0" smtClean="0"/>
-              <a:t>=c(1,2))  # create two graphs on a window</a:t>
-            </a:r>
-          </a:p>
-          <a:p>
-            <a:pPr lvl="2"/>
-            <a:r>
-              <a:rPr lang="en-US" altLang="ja-JP" dirty="0" smtClean="0"/>
-              <a:t>plot(x, y1, type=‘l’) # draw first graph</a:t>
-            </a:r>
-          </a:p>
-          <a:p>
-            <a:pPr lvl="2"/>
-            <a:r>
-              <a:rPr kumimoji="1" lang="en-US" altLang="ja-JP" dirty="0" smtClean="0"/>
-              <a:t>plot(x, y2, type=‘l’) # draw second graph</a:t>
-            </a:r>
-          </a:p>
-          <a:p>
-            <a:pPr lvl="2"/>
-            <a:r>
-              <a:rPr lang="en-US" altLang="ja-JP" dirty="0" smtClean="0"/>
-              <a:t>par(</a:t>
-            </a:r>
-            <a:r>
-              <a:rPr lang="en-US" altLang="ja-JP" dirty="0" err="1" smtClean="0"/>
-              <a:t>mfrow</a:t>
-            </a:r>
-            <a:r>
-              <a:rPr lang="en-US" altLang="ja-JP" dirty="0" smtClean="0"/>
-              <a:t>=c(1,1)) # reset layout(single graph)</a:t>
-            </a:r>
-          </a:p>
-          <a:p>
-            <a:pPr lvl="1"/>
-            <a:r>
-              <a:rPr kumimoji="1" lang="en-US" altLang="ja-JP" dirty="0" smtClean="0"/>
-              <a:t>Try 1. and 2. for x=</a:t>
-            </a:r>
-            <a:r>
-              <a:rPr kumimoji="1" lang="en-US" altLang="ja-JP" dirty="0" err="1" smtClean="0"/>
-              <a:t>seq</a:t>
-            </a:r>
-            <a:r>
-              <a:rPr kumimoji="1" lang="en-US" altLang="ja-JP" dirty="0" smtClean="0"/>
-              <a:t>(0,1,len=1000), y1=x^2, y2=</a:t>
-            </a:r>
-            <a:r>
-              <a:rPr kumimoji="1" lang="en-US" altLang="ja-JP" dirty="0" err="1" smtClean="0"/>
-              <a:t>exp</a:t>
-            </a:r>
-            <a:r>
-              <a:rPr kumimoji="1" lang="en-US" altLang="ja-JP" dirty="0" smtClean="0"/>
-              <a:t>(x)-1</a:t>
+              <a:t>From apple_production.csv</a:t>
+            </a:r>
+            <a:r>
+              <a:rPr lang="en-US" altLang="ja-JP" dirty="0"/>
+              <a:t>, make a chart of apple production by </a:t>
+            </a:r>
+            <a:r>
+              <a:rPr lang="en-US" altLang="ja-JP" dirty="0" smtClean="0"/>
+              <a:t>years, like</a:t>
             </a:r>
             <a:endParaRPr kumimoji="1" lang="ja-JP" altLang="en-US" dirty="0"/>
           </a:p>
         </p:txBody>
       </p:sp>
+      <p:pic>
+        <p:nvPicPr>
+          <p:cNvPr id="1026" name="Picture 2"/>
+          <p:cNvPicPr>
+            <a:picLocks noGrp="1" noChangeAspect="1" noChangeArrowheads="1"/>
+          </p:cNvPicPr>
+          <p:nvPr>
+            <p:ph sz="half" idx="2"/>
+          </p:nvPr>
+        </p:nvPicPr>
+        <p:blipFill>
+          <a:blip r:embed="rId2">
+            <a:extLst>
+              <a:ext uri="{28A0092B-C50C-407E-A947-70E740481C1C}">
+                <a14:useLocalDpi xmlns:a14="http://schemas.microsoft.com/office/drawing/2010/main" val="0"/>
+              </a:ext>
+            </a:extLst>
+          </a:blip>
+          <a:srcRect/>
+          <a:stretch>
+            <a:fillRect/>
+          </a:stretch>
+        </p:blipFill>
+        <p:spPr bwMode="auto">
+          <a:xfrm>
+            <a:off x="4648200" y="2416810"/>
+            <a:ext cx="4038600" cy="3230880"/>
+          </a:xfrm>
+          <a:prstGeom prst="rect">
+            <a:avLst/>
+          </a:prstGeom>
+          <a:noFill/>
+          <a:ln>
+            <a:noFill/>
+          </a:ln>
+          <a:extLst>
+            <a:ext uri="{909E8E84-426E-40DD-AFC4-6F175D3DCCD1}">
+              <a14:hiddenFill xmlns:a14="http://schemas.microsoft.com/office/drawing/2010/main">
+                <a:solidFill>
+                  <a:schemeClr val="accent1"/>
+                </a:solidFill>
+              </a14:hiddenFill>
+            </a:ext>
+            <a:ext uri="{91240B29-F687-4F45-9708-019B960494DF}">
+              <a14:hiddenLine xmlns:a14="http://schemas.microsoft.com/office/drawing/2010/main" w="9525">
+                <a:solidFill>
+                  <a:schemeClr val="tx1"/>
+                </a:solidFill>
+                <a:miter lim="800000"/>
+                <a:headEnd/>
+                <a:tailEnd/>
+              </a14:hiddenLine>
+            </a:ext>
+          </a:extLst>
+        </p:spPr>
+      </p:pic>
     </p:spTree>
     <p:extLst>
       <p:ext uri="{BB962C8B-B14F-4D97-AF65-F5344CB8AC3E}">
-        <p14:creationId xmlns:p14="http://schemas.microsoft.com/office/powerpoint/2010/main" val="2121717482"/>
+        <p14:creationId xmlns:p14="http://schemas.microsoft.com/office/powerpoint/2010/main" val="2116044513"/>
       </p:ext>
     </p:extLst>
   </p:cSld>

</xml_diff>

<commit_message>
fixed confusing problem settings
</commit_message>
<xml_diff>
--- a/pRactice.pptx
+++ b/pRactice.pptx
@@ -4028,11 +4028,7 @@
             </a:pPr>
             <a:r>
               <a:rPr lang="en-US" altLang="ja-JP" dirty="0" smtClean="0"/>
-              <a:t>From</a:t>
-            </a:r>
-            <a:r>
-              <a:rPr lang="en-US" altLang="ja-JP" dirty="0" smtClean="0"/>
-              <a:t> </a:t>
+              <a:t>From </a:t>
             </a:r>
             <a:r>
               <a:rPr lang="en-US" altLang="ja-JP" dirty="0"/>
@@ -4043,11 +4039,7 @@
             <a:pPr lvl="1"/>
             <a:r>
               <a:rPr lang="en-US" altLang="ja-JP" dirty="0" smtClean="0"/>
-              <a:t>y </a:t>
-            </a:r>
-            <a:r>
-              <a:rPr lang="en-US" altLang="ja-JP" dirty="0" smtClean="0"/>
-              <a:t>axis: pH</a:t>
+              <a:t>y axis: pH</a:t>
             </a:r>
             <a:endParaRPr lang="en-US" altLang="ja-JP" dirty="0"/>
           </a:p>
@@ -4213,15 +4205,7 @@
             </a:r>
             <a:r>
               <a:rPr lang="en-US" altLang="ja-JP" dirty="0" smtClean="0"/>
-              <a:t>four varieties </a:t>
-            </a:r>
-            <a:r>
-              <a:rPr lang="en-US" altLang="ja-JP" dirty="0" smtClean="0"/>
-              <a:t>(Fuji</a:t>
-            </a:r>
-            <a:r>
-              <a:rPr lang="en-US" altLang="ja-JP" dirty="0" smtClean="0"/>
-              <a:t>, Tsugaru, Orin, </a:t>
+              <a:t>four varieties (Fuji, Tsugaru, Orin, </a:t>
             </a:r>
             <a:r>
               <a:rPr lang="en-US" altLang="ja-JP" dirty="0" err="1" smtClean="0"/>
@@ -4990,13 +4974,14 @@
               <a:t>For </a:t>
             </a:r>
             <a:r>
-              <a:rPr lang="en-US" altLang="ja-JP" dirty="0"/>
-              <a:t>number between 1 and </a:t>
-            </a:r>
-            <a:r>
-              <a:rPr lang="en-US" altLang="ja-JP" dirty="0" smtClean="0"/>
-              <a:t>100,</a:t>
-            </a:r>
+              <a:rPr lang="en-US" altLang="ja-JP" dirty="0" smtClean="0"/>
+              <a:t>number smaller than </a:t>
+            </a:r>
+            <a:r>
+              <a:rPr lang="en-US" altLang="ja-JP" smtClean="0"/>
+              <a:t>or equal to 100,</a:t>
+            </a:r>
+            <a:endParaRPr lang="en-US" altLang="ja-JP" dirty="0" smtClean="0"/>
           </a:p>
           <a:p>
             <a:pPr lvl="1"/>
@@ -5699,8 +5684,17 @@
             </a:pPr>
             <a:r>
               <a:rPr kumimoji="1" lang="en-US" altLang="ja-JP" dirty="0" smtClean="0"/>
-              <a:t>Smaller than 1000</a:t>
-            </a:r>
+              <a:t>Smaller than </a:t>
+            </a:r>
+            <a:r>
+              <a:rPr lang="en-US" altLang="ja-JP" dirty="0" smtClean="0"/>
+              <a:t>or equal to</a:t>
+            </a:r>
+            <a:r>
+              <a:rPr kumimoji="1" lang="en-US" altLang="ja-JP" dirty="0" smtClean="0"/>
+              <a:t>1000</a:t>
+            </a:r>
+            <a:endParaRPr kumimoji="1" lang="en-US" altLang="ja-JP" dirty="0" smtClean="0"/>
           </a:p>
           <a:p>
             <a:pPr lvl="1"/>
@@ -5795,8 +5789,8 @@
           </a:p>
         </p:txBody>
       </p:sp>
-      <mc:AlternateContent xmlns:mc="http://schemas.openxmlformats.org/markup-compatibility/2006" xmlns:a14="http://schemas.microsoft.com/office/drawing/2010/main">
-        <mc:Choice Requires="a14">
+      <mc:AlternateContent xmlns:mc="http://schemas.openxmlformats.org/markup-compatibility/2006">
+        <mc:Choice xmlns:a14="http://schemas.microsoft.com/office/drawing/2010/main" Requires="a14">
           <p:sp>
             <p:nvSpPr>
               <p:cNvPr id="3" name="コンテンツ プレースホルダー 2"/>
@@ -5843,8 +5837,13 @@
                 </a:pPr>
                 <a:r>
                   <a:rPr lang="en-US" altLang="ja-JP" dirty="0"/>
-                  <a:t>Smaller than 1000</a:t>
+                  <a:t>Smaller than </a:t>
                 </a:r>
+                <a:r>
+                  <a:rPr lang="en-US" altLang="ja-JP" dirty="0" smtClean="0"/>
+                  <a:t>or equal to1000</a:t>
+                </a:r>
+                <a:endParaRPr lang="en-US" altLang="ja-JP" dirty="0"/>
               </a:p>
               <a:p>
                 <a:pPr lvl="1"/>
@@ -6029,7 +6028,7 @@
             </p:txBody>
           </p:sp>
         </mc:Choice>
-        <mc:Fallback xmlns="">
+        <mc:Fallback>
           <p:sp>
             <p:nvSpPr>
               <p:cNvPr id="3" name="コンテンツ プレースホルダー 2"/>

</xml_diff>